<commit_message>
added software structure document
</commit_message>
<xml_diff>
--- a/01_doc/TinyDisplay.pptx
+++ b/01_doc/TinyDisplay.pptx
@@ -6,6 +6,8 @@
   </p:sldMasterIdLst>
   <p:sldIdLst>
     <p:sldId id="257" r:id="rId2"/>
+    <p:sldId id="258" r:id="rId3"/>
+    <p:sldId id="259" r:id="rId4"/>
   </p:sldIdLst>
   <p:sldSz cx="12192000" cy="6858000"/>
   <p:notesSz cx="6858000" cy="9144000"/>
@@ -104,6 +106,11 @@
       </a:defRPr>
     </a:lvl9pPr>
   </p:defaultTextStyle>
+  <p:extLst>
+    <p:ext uri="{EFAFB233-063F-42B5-8137-9DF3F51BA10A}">
+      <p15:sldGuideLst xmlns:p15="http://schemas.microsoft.com/office/powerpoint/2012/main"/>
+    </p:ext>
+  </p:extLst>
 </p:presentation>
 </file>
 
@@ -238,7 +245,7 @@
           <a:p>
             <a:fld id="{2DD5872B-7991-4A00-95ED-06D285747B9C}" type="datetimeFigureOut">
               <a:rPr lang="en-CA" smtClean="0"/>
-              <a:t>2016-03-05</a:t>
+              <a:t>2016-03-06</a:t>
             </a:fld>
             <a:endParaRPr lang="en-CA"/>
           </a:p>
@@ -408,7 +415,7 @@
           <a:p>
             <a:fld id="{2DD5872B-7991-4A00-95ED-06D285747B9C}" type="datetimeFigureOut">
               <a:rPr lang="en-CA" smtClean="0"/>
-              <a:t>2016-03-05</a:t>
+              <a:t>2016-03-06</a:t>
             </a:fld>
             <a:endParaRPr lang="en-CA"/>
           </a:p>
@@ -588,7 +595,7 @@
           <a:p>
             <a:fld id="{2DD5872B-7991-4A00-95ED-06D285747B9C}" type="datetimeFigureOut">
               <a:rPr lang="en-CA" smtClean="0"/>
-              <a:t>2016-03-05</a:t>
+              <a:t>2016-03-06</a:t>
             </a:fld>
             <a:endParaRPr lang="en-CA"/>
           </a:p>
@@ -758,7 +765,7 @@
           <a:p>
             <a:fld id="{2DD5872B-7991-4A00-95ED-06D285747B9C}" type="datetimeFigureOut">
               <a:rPr lang="en-CA" smtClean="0"/>
-              <a:t>2016-03-05</a:t>
+              <a:t>2016-03-06</a:t>
             </a:fld>
             <a:endParaRPr lang="en-CA"/>
           </a:p>
@@ -1004,7 +1011,7 @@
           <a:p>
             <a:fld id="{2DD5872B-7991-4A00-95ED-06D285747B9C}" type="datetimeFigureOut">
               <a:rPr lang="en-CA" smtClean="0"/>
-              <a:t>2016-03-05</a:t>
+              <a:t>2016-03-06</a:t>
             </a:fld>
             <a:endParaRPr lang="en-CA"/>
           </a:p>
@@ -1236,7 +1243,7 @@
           <a:p>
             <a:fld id="{2DD5872B-7991-4A00-95ED-06D285747B9C}" type="datetimeFigureOut">
               <a:rPr lang="en-CA" smtClean="0"/>
-              <a:t>2016-03-05</a:t>
+              <a:t>2016-03-06</a:t>
             </a:fld>
             <a:endParaRPr lang="en-CA"/>
           </a:p>
@@ -1603,7 +1610,7 @@
           <a:p>
             <a:fld id="{2DD5872B-7991-4A00-95ED-06D285747B9C}" type="datetimeFigureOut">
               <a:rPr lang="en-CA" smtClean="0"/>
-              <a:t>2016-03-05</a:t>
+              <a:t>2016-03-06</a:t>
             </a:fld>
             <a:endParaRPr lang="en-CA"/>
           </a:p>
@@ -1721,7 +1728,7 @@
           <a:p>
             <a:fld id="{2DD5872B-7991-4A00-95ED-06D285747B9C}" type="datetimeFigureOut">
               <a:rPr lang="en-CA" smtClean="0"/>
-              <a:t>2016-03-05</a:t>
+              <a:t>2016-03-06</a:t>
             </a:fld>
             <a:endParaRPr lang="en-CA"/>
           </a:p>
@@ -1816,7 +1823,7 @@
           <a:p>
             <a:fld id="{2DD5872B-7991-4A00-95ED-06D285747B9C}" type="datetimeFigureOut">
               <a:rPr lang="en-CA" smtClean="0"/>
-              <a:t>2016-03-05</a:t>
+              <a:t>2016-03-06</a:t>
             </a:fld>
             <a:endParaRPr lang="en-CA"/>
           </a:p>
@@ -2093,7 +2100,7 @@
           <a:p>
             <a:fld id="{2DD5872B-7991-4A00-95ED-06D285747B9C}" type="datetimeFigureOut">
               <a:rPr lang="en-CA" smtClean="0"/>
-              <a:t>2016-03-05</a:t>
+              <a:t>2016-03-06</a:t>
             </a:fld>
             <a:endParaRPr lang="en-CA"/>
           </a:p>
@@ -2346,7 +2353,7 @@
           <a:p>
             <a:fld id="{2DD5872B-7991-4A00-95ED-06D285747B9C}" type="datetimeFigureOut">
               <a:rPr lang="en-CA" smtClean="0"/>
-              <a:t>2016-03-05</a:t>
+              <a:t>2016-03-06</a:t>
             </a:fld>
             <a:endParaRPr lang="en-CA"/>
           </a:p>
@@ -2559,7 +2566,7 @@
           <a:p>
             <a:fld id="{2DD5872B-7991-4A00-95ED-06D285747B9C}" type="datetimeFigureOut">
               <a:rPr lang="en-CA" smtClean="0"/>
-              <a:t>2016-03-05</a:t>
+              <a:t>2016-03-06</a:t>
             </a:fld>
             <a:endParaRPr lang="en-CA"/>
           </a:p>
@@ -3913,6 +3920,4492 @@
 </p:sld>
 </file>
 
+<file path=ppt/slides/slide2.xml><?xml version="1.0" encoding="utf-8"?>
+<p:sld xmlns:a="http://schemas.openxmlformats.org/drawingml/2006/main" xmlns:r="http://schemas.openxmlformats.org/officeDocument/2006/relationships" xmlns:p="http://schemas.openxmlformats.org/presentationml/2006/main">
+  <p:cSld>
+    <p:spTree>
+      <p:nvGrpSpPr>
+        <p:cNvPr id="1" name=""/>
+        <p:cNvGrpSpPr/>
+        <p:nvPr/>
+      </p:nvGrpSpPr>
+      <p:grpSpPr>
+        <a:xfrm>
+          <a:off x="0" y="0"/>
+          <a:ext cx="0" cy="0"/>
+          <a:chOff x="0" y="0"/>
+          <a:chExt cx="0" cy="0"/>
+        </a:xfrm>
+      </p:grpSpPr>
+      <p:sp>
+        <p:nvSpPr>
+          <p:cNvPr id="64" name="Rectangle 63"/>
+          <p:cNvSpPr/>
+          <p:nvPr/>
+        </p:nvSpPr>
+        <p:spPr>
+          <a:xfrm>
+            <a:off x="9337656" y="2687206"/>
+            <a:ext cx="2818965" cy="1908071"/>
+          </a:xfrm>
+          <a:prstGeom prst="rect">
+            <a:avLst/>
+          </a:prstGeom>
+          <a:solidFill>
+            <a:schemeClr val="accent4">
+              <a:lumMod val="20000"/>
+              <a:lumOff val="80000"/>
+            </a:schemeClr>
+          </a:solidFill>
+          <a:ln>
+            <a:solidFill>
+              <a:schemeClr val="tx1"/>
+            </a:solidFill>
+          </a:ln>
+        </p:spPr>
+        <p:style>
+          <a:lnRef idx="2">
+            <a:schemeClr val="accent1">
+              <a:shade val="50000"/>
+            </a:schemeClr>
+          </a:lnRef>
+          <a:fillRef idx="1">
+            <a:schemeClr val="accent1"/>
+          </a:fillRef>
+          <a:effectRef idx="0">
+            <a:schemeClr val="accent1"/>
+          </a:effectRef>
+          <a:fontRef idx="minor">
+            <a:schemeClr val="lt1"/>
+          </a:fontRef>
+        </p:style>
+        <p:txBody>
+          <a:bodyPr rtlCol="0" anchor="t" anchorCtr="0"/>
+          <a:lstStyle/>
+          <a:p>
+            <a:endParaRPr lang="en-CA" dirty="0">
+              <a:solidFill>
+                <a:schemeClr val="tx1"/>
+              </a:solidFill>
+            </a:endParaRPr>
+          </a:p>
+        </p:txBody>
+      </p:sp>
+      <p:sp>
+        <p:nvSpPr>
+          <p:cNvPr id="6" name="Rectangle 5"/>
+          <p:cNvSpPr/>
+          <p:nvPr/>
+        </p:nvSpPr>
+        <p:spPr>
+          <a:xfrm>
+            <a:off x="1790309" y="2687206"/>
+            <a:ext cx="7027190" cy="1908071"/>
+          </a:xfrm>
+          <a:prstGeom prst="rect">
+            <a:avLst/>
+          </a:prstGeom>
+          <a:solidFill>
+            <a:schemeClr val="accent4">
+              <a:lumMod val="20000"/>
+              <a:lumOff val="80000"/>
+            </a:schemeClr>
+          </a:solidFill>
+          <a:ln>
+            <a:solidFill>
+              <a:schemeClr val="tx1"/>
+            </a:solidFill>
+          </a:ln>
+        </p:spPr>
+        <p:style>
+          <a:lnRef idx="2">
+            <a:schemeClr val="accent1">
+              <a:shade val="50000"/>
+            </a:schemeClr>
+          </a:lnRef>
+          <a:fillRef idx="1">
+            <a:schemeClr val="accent1"/>
+          </a:fillRef>
+          <a:effectRef idx="0">
+            <a:schemeClr val="accent1"/>
+          </a:effectRef>
+          <a:fontRef idx="minor">
+            <a:schemeClr val="lt1"/>
+          </a:fontRef>
+        </p:style>
+        <p:txBody>
+          <a:bodyPr rtlCol="0" anchor="t" anchorCtr="0"/>
+          <a:lstStyle/>
+          <a:p>
+            <a:endParaRPr lang="en-CA" dirty="0">
+              <a:solidFill>
+                <a:schemeClr val="tx1"/>
+              </a:solidFill>
+            </a:endParaRPr>
+          </a:p>
+        </p:txBody>
+      </p:sp>
+      <p:sp>
+        <p:nvSpPr>
+          <p:cNvPr id="8" name="Rectangle 7"/>
+          <p:cNvSpPr/>
+          <p:nvPr/>
+        </p:nvSpPr>
+        <p:spPr>
+          <a:xfrm>
+            <a:off x="942990" y="2248494"/>
+            <a:ext cx="1663148" cy="461665"/>
+          </a:xfrm>
+          <a:prstGeom prst="rect">
+            <a:avLst/>
+          </a:prstGeom>
+        </p:spPr>
+        <p:txBody>
+          <a:bodyPr wrap="none">
+            <a:spAutoFit/>
+          </a:bodyPr>
+          <a:lstStyle/>
+          <a:p>
+            <a:r>
+              <a:rPr lang="en-US" sz="2400" b="1" dirty="0" err="1" smtClean="0">
+                <a:solidFill>
+                  <a:schemeClr val="accent1">
+                    <a:lumMod val="50000"/>
+                  </a:schemeClr>
+                </a:solidFill>
+              </a:rPr>
+              <a:t>myLibraries</a:t>
+            </a:r>
+            <a:endParaRPr lang="en-CA" sz="2400" b="1" dirty="0">
+              <a:solidFill>
+                <a:schemeClr val="accent1">
+                  <a:lumMod val="50000"/>
+                </a:schemeClr>
+              </a:solidFill>
+            </a:endParaRPr>
+          </a:p>
+        </p:txBody>
+      </p:sp>
+      <p:sp>
+        <p:nvSpPr>
+          <p:cNvPr id="9" name="Rectangle 8"/>
+          <p:cNvSpPr/>
+          <p:nvPr/>
+        </p:nvSpPr>
+        <p:spPr>
+          <a:xfrm>
+            <a:off x="2092461" y="2951863"/>
+            <a:ext cx="1392804" cy="1248356"/>
+          </a:xfrm>
+          <a:prstGeom prst="rect">
+            <a:avLst/>
+          </a:prstGeom>
+          <a:solidFill>
+            <a:schemeClr val="accent2">
+              <a:lumMod val="40000"/>
+              <a:lumOff val="60000"/>
+            </a:schemeClr>
+          </a:solidFill>
+          <a:ln>
+            <a:solidFill>
+              <a:schemeClr val="tx1"/>
+            </a:solidFill>
+          </a:ln>
+        </p:spPr>
+        <p:style>
+          <a:lnRef idx="2">
+            <a:schemeClr val="accent1">
+              <a:shade val="50000"/>
+            </a:schemeClr>
+          </a:lnRef>
+          <a:fillRef idx="1">
+            <a:schemeClr val="accent1"/>
+          </a:fillRef>
+          <a:effectRef idx="0">
+            <a:schemeClr val="accent1"/>
+          </a:effectRef>
+          <a:fontRef idx="minor">
+            <a:schemeClr val="lt1"/>
+          </a:fontRef>
+        </p:style>
+        <p:txBody>
+          <a:bodyPr rtlCol="0" anchor="t" anchorCtr="0"/>
+          <a:lstStyle/>
+          <a:p>
+            <a:r>
+              <a:rPr lang="en-US" dirty="0" err="1" smtClean="0">
+                <a:solidFill>
+                  <a:schemeClr val="tx1"/>
+                </a:solidFill>
+              </a:rPr>
+              <a:t>myStdio</a:t>
+            </a:r>
+            <a:endParaRPr lang="en-US" dirty="0" smtClean="0">
+              <a:solidFill>
+                <a:schemeClr val="tx1"/>
+              </a:solidFill>
+            </a:endParaRPr>
+          </a:p>
+          <a:p>
+            <a:r>
+              <a:rPr lang="en-US" dirty="0">
+                <a:solidFill>
+                  <a:schemeClr val="tx1"/>
+                </a:solidFill>
+              </a:rPr>
+              <a:t> </a:t>
+            </a:r>
+            <a:r>
+              <a:rPr lang="en-US" dirty="0" smtClean="0">
+                <a:solidFill>
+                  <a:schemeClr val="tx1"/>
+                </a:solidFill>
+              </a:rPr>
+              <a:t>- print</a:t>
+            </a:r>
+          </a:p>
+          <a:p>
+            <a:r>
+              <a:rPr lang="en-US" dirty="0">
+                <a:solidFill>
+                  <a:schemeClr val="tx1"/>
+                </a:solidFill>
+              </a:rPr>
+              <a:t> </a:t>
+            </a:r>
+            <a:r>
+              <a:rPr lang="en-US" dirty="0" smtClean="0">
+                <a:solidFill>
+                  <a:schemeClr val="tx1"/>
+                </a:solidFill>
+              </a:rPr>
+              <a:t>- </a:t>
+            </a:r>
+            <a:r>
+              <a:rPr lang="en-US" dirty="0" err="1" smtClean="0">
+                <a:solidFill>
+                  <a:schemeClr val="tx1"/>
+                </a:solidFill>
+              </a:rPr>
+              <a:t>getchar</a:t>
+            </a:r>
+            <a:endParaRPr lang="en-US" dirty="0" smtClean="0">
+              <a:solidFill>
+                <a:schemeClr val="tx1"/>
+              </a:solidFill>
+            </a:endParaRPr>
+          </a:p>
+          <a:p>
+            <a:r>
+              <a:rPr lang="en-US" dirty="0">
+                <a:solidFill>
+                  <a:schemeClr val="tx1"/>
+                </a:solidFill>
+              </a:rPr>
+              <a:t> </a:t>
+            </a:r>
+            <a:r>
+              <a:rPr lang="en-US" dirty="0" smtClean="0">
+                <a:solidFill>
+                  <a:schemeClr val="tx1"/>
+                </a:solidFill>
+              </a:rPr>
+              <a:t>-etc.</a:t>
+            </a:r>
+            <a:endParaRPr lang="en-CA" dirty="0">
+              <a:solidFill>
+                <a:schemeClr val="tx1"/>
+              </a:solidFill>
+            </a:endParaRPr>
+          </a:p>
+        </p:txBody>
+      </p:sp>
+      <p:sp>
+        <p:nvSpPr>
+          <p:cNvPr id="10" name="Rectangle 9"/>
+          <p:cNvSpPr/>
+          <p:nvPr/>
+        </p:nvSpPr>
+        <p:spPr>
+          <a:xfrm>
+            <a:off x="6837178" y="2951863"/>
+            <a:ext cx="1606164" cy="1248356"/>
+          </a:xfrm>
+          <a:prstGeom prst="rect">
+            <a:avLst/>
+          </a:prstGeom>
+          <a:solidFill>
+            <a:schemeClr val="accent2">
+              <a:lumMod val="40000"/>
+              <a:lumOff val="60000"/>
+            </a:schemeClr>
+          </a:solidFill>
+          <a:ln>
+            <a:solidFill>
+              <a:schemeClr val="tx1"/>
+            </a:solidFill>
+          </a:ln>
+        </p:spPr>
+        <p:style>
+          <a:lnRef idx="2">
+            <a:schemeClr val="accent1">
+              <a:shade val="50000"/>
+            </a:schemeClr>
+          </a:lnRef>
+          <a:fillRef idx="1">
+            <a:schemeClr val="accent1"/>
+          </a:fillRef>
+          <a:effectRef idx="0">
+            <a:schemeClr val="accent1"/>
+          </a:effectRef>
+          <a:fontRef idx="minor">
+            <a:schemeClr val="lt1"/>
+          </a:fontRef>
+        </p:style>
+        <p:txBody>
+          <a:bodyPr rtlCol="0" anchor="t" anchorCtr="0"/>
+          <a:lstStyle/>
+          <a:p>
+            <a:r>
+              <a:rPr lang="en-US" dirty="0" err="1" smtClean="0">
+                <a:solidFill>
+                  <a:schemeClr val="tx1"/>
+                </a:solidFill>
+              </a:rPr>
+              <a:t>myTimer</a:t>
+            </a:r>
+            <a:endParaRPr lang="en-US" dirty="0" smtClean="0">
+              <a:solidFill>
+                <a:schemeClr val="tx1"/>
+              </a:solidFill>
+            </a:endParaRPr>
+          </a:p>
+          <a:p>
+            <a:r>
+              <a:rPr lang="en-US" dirty="0">
+                <a:solidFill>
+                  <a:schemeClr val="tx1"/>
+                </a:solidFill>
+              </a:rPr>
+              <a:t> </a:t>
+            </a:r>
+            <a:r>
+              <a:rPr lang="en-US" dirty="0" smtClean="0">
+                <a:solidFill>
+                  <a:schemeClr val="tx1"/>
+                </a:solidFill>
+              </a:rPr>
+              <a:t>- </a:t>
+            </a:r>
+            <a:r>
+              <a:rPr lang="en-US" dirty="0" err="1" smtClean="0">
+                <a:solidFill>
+                  <a:schemeClr val="tx1"/>
+                </a:solidFill>
+              </a:rPr>
+              <a:t>getTimerMS</a:t>
+            </a:r>
+            <a:endParaRPr lang="en-US" dirty="0" smtClean="0">
+              <a:solidFill>
+                <a:schemeClr val="tx1"/>
+              </a:solidFill>
+            </a:endParaRPr>
+          </a:p>
+          <a:p>
+            <a:r>
+              <a:rPr lang="en-US" dirty="0">
+                <a:solidFill>
+                  <a:schemeClr val="tx1"/>
+                </a:solidFill>
+              </a:rPr>
+              <a:t> </a:t>
+            </a:r>
+            <a:r>
+              <a:rPr lang="en-US" dirty="0" smtClean="0">
+                <a:solidFill>
+                  <a:schemeClr val="tx1"/>
+                </a:solidFill>
+              </a:rPr>
+              <a:t>- etc.</a:t>
+            </a:r>
+            <a:endParaRPr lang="en-CA" dirty="0">
+              <a:solidFill>
+                <a:schemeClr val="tx1"/>
+              </a:solidFill>
+            </a:endParaRPr>
+          </a:p>
+        </p:txBody>
+      </p:sp>
+      <p:sp>
+        <p:nvSpPr>
+          <p:cNvPr id="11" name="Rectangle 10"/>
+          <p:cNvSpPr/>
+          <p:nvPr/>
+        </p:nvSpPr>
+        <p:spPr>
+          <a:xfrm>
+            <a:off x="4230479" y="2943910"/>
+            <a:ext cx="1886670" cy="1256309"/>
+          </a:xfrm>
+          <a:prstGeom prst="rect">
+            <a:avLst/>
+          </a:prstGeom>
+          <a:solidFill>
+            <a:schemeClr val="accent2">
+              <a:lumMod val="40000"/>
+              <a:lumOff val="60000"/>
+            </a:schemeClr>
+          </a:solidFill>
+          <a:ln>
+            <a:solidFill>
+              <a:schemeClr val="tx1"/>
+            </a:solidFill>
+          </a:ln>
+        </p:spPr>
+        <p:style>
+          <a:lnRef idx="2">
+            <a:schemeClr val="accent1">
+              <a:shade val="50000"/>
+            </a:schemeClr>
+          </a:lnRef>
+          <a:fillRef idx="1">
+            <a:schemeClr val="accent1"/>
+          </a:fillRef>
+          <a:effectRef idx="0">
+            <a:schemeClr val="accent1"/>
+          </a:effectRef>
+          <a:fontRef idx="minor">
+            <a:schemeClr val="lt1"/>
+          </a:fontRef>
+        </p:style>
+        <p:txBody>
+          <a:bodyPr rtlCol="0" anchor="t" anchorCtr="0"/>
+          <a:lstStyle/>
+          <a:p>
+            <a:r>
+              <a:rPr lang="en-US" dirty="0" err="1" smtClean="0">
+                <a:solidFill>
+                  <a:schemeClr val="tx1"/>
+                </a:solidFill>
+              </a:rPr>
+              <a:t>myVideo</a:t>
+            </a:r>
+            <a:endParaRPr lang="en-US" dirty="0" smtClean="0">
+              <a:solidFill>
+                <a:schemeClr val="tx1"/>
+              </a:solidFill>
+            </a:endParaRPr>
+          </a:p>
+          <a:p>
+            <a:r>
+              <a:rPr lang="en-US" dirty="0">
+                <a:solidFill>
+                  <a:schemeClr val="tx1"/>
+                </a:solidFill>
+              </a:rPr>
+              <a:t> </a:t>
+            </a:r>
+            <a:r>
+              <a:rPr lang="en-US" dirty="0" smtClean="0">
+                <a:solidFill>
+                  <a:schemeClr val="tx1"/>
+                </a:solidFill>
+              </a:rPr>
+              <a:t>- </a:t>
+            </a:r>
+            <a:r>
+              <a:rPr lang="en-US" dirty="0" err="1" smtClean="0">
+                <a:solidFill>
+                  <a:schemeClr val="tx1"/>
+                </a:solidFill>
+              </a:rPr>
+              <a:t>drawPixel</a:t>
+            </a:r>
+            <a:endParaRPr lang="en-US" dirty="0" smtClean="0">
+              <a:solidFill>
+                <a:schemeClr val="tx1"/>
+              </a:solidFill>
+            </a:endParaRPr>
+          </a:p>
+          <a:p>
+            <a:r>
+              <a:rPr lang="en-US" dirty="0">
+                <a:solidFill>
+                  <a:schemeClr val="tx1"/>
+                </a:solidFill>
+              </a:rPr>
+              <a:t> </a:t>
+            </a:r>
+            <a:r>
+              <a:rPr lang="en-US" dirty="0" smtClean="0">
+                <a:solidFill>
+                  <a:schemeClr val="tx1"/>
+                </a:solidFill>
+              </a:rPr>
+              <a:t>- </a:t>
+            </a:r>
+            <a:r>
+              <a:rPr lang="en-US" dirty="0" err="1" smtClean="0">
+                <a:solidFill>
+                  <a:schemeClr val="tx1"/>
+                </a:solidFill>
+              </a:rPr>
+              <a:t>drawLineBuffer</a:t>
+            </a:r>
+            <a:endParaRPr lang="en-US" dirty="0" smtClean="0">
+              <a:solidFill>
+                <a:schemeClr val="tx1"/>
+              </a:solidFill>
+            </a:endParaRPr>
+          </a:p>
+          <a:p>
+            <a:r>
+              <a:rPr lang="en-US" dirty="0">
+                <a:solidFill>
+                  <a:schemeClr val="tx1"/>
+                </a:solidFill>
+              </a:rPr>
+              <a:t> </a:t>
+            </a:r>
+            <a:r>
+              <a:rPr lang="en-US" dirty="0" smtClean="0">
+                <a:solidFill>
+                  <a:schemeClr val="tx1"/>
+                </a:solidFill>
+              </a:rPr>
+              <a:t>- etc.</a:t>
+            </a:r>
+            <a:endParaRPr lang="en-CA" dirty="0">
+              <a:solidFill>
+                <a:schemeClr val="tx1"/>
+              </a:solidFill>
+            </a:endParaRPr>
+          </a:p>
+        </p:txBody>
+      </p:sp>
+      <p:sp>
+        <p:nvSpPr>
+          <p:cNvPr id="12" name="Rectangle 11"/>
+          <p:cNvSpPr/>
+          <p:nvPr/>
+        </p:nvSpPr>
+        <p:spPr>
+          <a:xfrm>
+            <a:off x="966974" y="5576597"/>
+            <a:ext cx="1171715" cy="392550"/>
+          </a:xfrm>
+          <a:prstGeom prst="rect">
+            <a:avLst/>
+          </a:prstGeom>
+          <a:solidFill>
+            <a:schemeClr val="bg1">
+              <a:lumMod val="65000"/>
+            </a:schemeClr>
+          </a:solidFill>
+          <a:ln>
+            <a:solidFill>
+              <a:schemeClr val="tx1"/>
+            </a:solidFill>
+          </a:ln>
+        </p:spPr>
+        <p:style>
+          <a:lnRef idx="2">
+            <a:schemeClr val="accent1">
+              <a:shade val="50000"/>
+            </a:schemeClr>
+          </a:lnRef>
+          <a:fillRef idx="1">
+            <a:schemeClr val="accent1"/>
+          </a:fillRef>
+          <a:effectRef idx="0">
+            <a:schemeClr val="accent1"/>
+          </a:effectRef>
+          <a:fontRef idx="minor">
+            <a:schemeClr val="lt1"/>
+          </a:fontRef>
+        </p:style>
+        <p:txBody>
+          <a:bodyPr rtlCol="0" anchor="t" anchorCtr="0"/>
+          <a:lstStyle/>
+          <a:p>
+            <a:r>
+              <a:rPr lang="en-US" dirty="0" err="1" smtClean="0">
+                <a:solidFill>
+                  <a:schemeClr val="tx1"/>
+                </a:solidFill>
+              </a:rPr>
+              <a:t>charLcd</a:t>
+            </a:r>
+            <a:endParaRPr lang="en-CA" dirty="0">
+              <a:solidFill>
+                <a:schemeClr val="tx1"/>
+              </a:solidFill>
+            </a:endParaRPr>
+          </a:p>
+        </p:txBody>
+      </p:sp>
+      <p:sp>
+        <p:nvSpPr>
+          <p:cNvPr id="13" name="Rectangle 12"/>
+          <p:cNvSpPr/>
+          <p:nvPr/>
+        </p:nvSpPr>
+        <p:spPr>
+          <a:xfrm>
+            <a:off x="3733530" y="5568646"/>
+            <a:ext cx="1736755" cy="392550"/>
+          </a:xfrm>
+          <a:prstGeom prst="rect">
+            <a:avLst/>
+          </a:prstGeom>
+          <a:solidFill>
+            <a:schemeClr val="accent2">
+              <a:lumMod val="40000"/>
+              <a:lumOff val="60000"/>
+            </a:schemeClr>
+          </a:solidFill>
+          <a:ln>
+            <a:solidFill>
+              <a:schemeClr val="tx1"/>
+            </a:solidFill>
+          </a:ln>
+        </p:spPr>
+        <p:style>
+          <a:lnRef idx="2">
+            <a:schemeClr val="accent1">
+              <a:shade val="50000"/>
+            </a:schemeClr>
+          </a:lnRef>
+          <a:fillRef idx="1">
+            <a:schemeClr val="accent1"/>
+          </a:fillRef>
+          <a:effectRef idx="0">
+            <a:schemeClr val="accent1"/>
+          </a:effectRef>
+          <a:fontRef idx="minor">
+            <a:schemeClr val="lt1"/>
+          </a:fontRef>
+        </p:style>
+        <p:txBody>
+          <a:bodyPr rtlCol="0" anchor="t" anchorCtr="0"/>
+          <a:lstStyle/>
+          <a:p>
+            <a:r>
+              <a:rPr lang="en-US" dirty="0" smtClean="0">
+                <a:solidFill>
+                  <a:schemeClr val="tx1"/>
+                </a:solidFill>
+              </a:rPr>
+              <a:t>lcdST7735R_SPI</a:t>
+            </a:r>
+            <a:endParaRPr lang="en-CA" dirty="0">
+              <a:solidFill>
+                <a:schemeClr val="tx1"/>
+              </a:solidFill>
+            </a:endParaRPr>
+          </a:p>
+        </p:txBody>
+      </p:sp>
+      <p:sp>
+        <p:nvSpPr>
+          <p:cNvPr id="15" name="Rectangle 14"/>
+          <p:cNvSpPr/>
+          <p:nvPr/>
+        </p:nvSpPr>
+        <p:spPr>
+          <a:xfrm>
+            <a:off x="7066758" y="5568646"/>
+            <a:ext cx="1708044" cy="392550"/>
+          </a:xfrm>
+          <a:prstGeom prst="rect">
+            <a:avLst/>
+          </a:prstGeom>
+          <a:solidFill>
+            <a:schemeClr val="accent2">
+              <a:lumMod val="40000"/>
+              <a:lumOff val="60000"/>
+            </a:schemeClr>
+          </a:solidFill>
+          <a:ln>
+            <a:solidFill>
+              <a:schemeClr val="tx1"/>
+            </a:solidFill>
+          </a:ln>
+        </p:spPr>
+        <p:style>
+          <a:lnRef idx="2">
+            <a:schemeClr val="accent1">
+              <a:shade val="50000"/>
+            </a:schemeClr>
+          </a:lnRef>
+          <a:fillRef idx="1">
+            <a:schemeClr val="accent1"/>
+          </a:fillRef>
+          <a:effectRef idx="0">
+            <a:schemeClr val="accent1"/>
+          </a:effectRef>
+          <a:fontRef idx="minor">
+            <a:schemeClr val="lt1"/>
+          </a:fontRef>
+        </p:style>
+        <p:txBody>
+          <a:bodyPr rtlCol="0" anchor="t" anchorCtr="0"/>
+          <a:lstStyle/>
+          <a:p>
+            <a:r>
+              <a:rPr lang="en-US" dirty="0" smtClean="0">
+                <a:solidFill>
+                  <a:schemeClr val="tx1"/>
+                </a:solidFill>
+              </a:rPr>
+              <a:t>timer0System</a:t>
+            </a:r>
+            <a:endParaRPr lang="en-CA" dirty="0">
+              <a:solidFill>
+                <a:schemeClr val="tx1"/>
+              </a:solidFill>
+            </a:endParaRPr>
+          </a:p>
+        </p:txBody>
+      </p:sp>
+      <p:sp>
+        <p:nvSpPr>
+          <p:cNvPr id="16" name="Rectangle 15"/>
+          <p:cNvSpPr/>
+          <p:nvPr/>
+        </p:nvSpPr>
+        <p:spPr>
+          <a:xfrm>
+            <a:off x="2515572" y="5584548"/>
+            <a:ext cx="795666" cy="392550"/>
+          </a:xfrm>
+          <a:prstGeom prst="rect">
+            <a:avLst/>
+          </a:prstGeom>
+          <a:solidFill>
+            <a:schemeClr val="accent2">
+              <a:lumMod val="40000"/>
+              <a:lumOff val="60000"/>
+            </a:schemeClr>
+          </a:solidFill>
+          <a:ln>
+            <a:solidFill>
+              <a:schemeClr val="tx1"/>
+            </a:solidFill>
+          </a:ln>
+        </p:spPr>
+        <p:style>
+          <a:lnRef idx="2">
+            <a:schemeClr val="accent1">
+              <a:shade val="50000"/>
+            </a:schemeClr>
+          </a:lnRef>
+          <a:fillRef idx="1">
+            <a:schemeClr val="accent1"/>
+          </a:fillRef>
+          <a:effectRef idx="0">
+            <a:schemeClr val="accent1"/>
+          </a:effectRef>
+          <a:fontRef idx="minor">
+            <a:schemeClr val="lt1"/>
+          </a:fontRef>
+        </p:style>
+        <p:txBody>
+          <a:bodyPr rtlCol="0" anchor="t" anchorCtr="0"/>
+          <a:lstStyle/>
+          <a:p>
+            <a:r>
+              <a:rPr lang="en-US" dirty="0" smtClean="0">
+                <a:solidFill>
+                  <a:schemeClr val="tx1"/>
+                </a:solidFill>
+              </a:rPr>
+              <a:t>uart0</a:t>
+            </a:r>
+            <a:endParaRPr lang="en-CA" dirty="0">
+              <a:solidFill>
+                <a:schemeClr val="tx1"/>
+              </a:solidFill>
+            </a:endParaRPr>
+          </a:p>
+        </p:txBody>
+      </p:sp>
+      <p:sp>
+        <p:nvSpPr>
+          <p:cNvPr id="17" name="Rectangle 16"/>
+          <p:cNvSpPr/>
+          <p:nvPr/>
+        </p:nvSpPr>
+        <p:spPr>
+          <a:xfrm>
+            <a:off x="8248132" y="6335666"/>
+            <a:ext cx="878912" cy="392550"/>
+          </a:xfrm>
+          <a:prstGeom prst="rect">
+            <a:avLst/>
+          </a:prstGeom>
+          <a:solidFill>
+            <a:schemeClr val="accent2">
+              <a:lumMod val="40000"/>
+              <a:lumOff val="60000"/>
+            </a:schemeClr>
+          </a:solidFill>
+          <a:ln>
+            <a:solidFill>
+              <a:schemeClr val="tx1"/>
+            </a:solidFill>
+          </a:ln>
+        </p:spPr>
+        <p:style>
+          <a:lnRef idx="2">
+            <a:schemeClr val="accent1">
+              <a:shade val="50000"/>
+            </a:schemeClr>
+          </a:lnRef>
+          <a:fillRef idx="1">
+            <a:schemeClr val="accent1"/>
+          </a:fillRef>
+          <a:effectRef idx="0">
+            <a:schemeClr val="accent1"/>
+          </a:effectRef>
+          <a:fontRef idx="minor">
+            <a:schemeClr val="lt1"/>
+          </a:fontRef>
+        </p:style>
+        <p:txBody>
+          <a:bodyPr rtlCol="0" anchor="t" anchorCtr="0"/>
+          <a:lstStyle/>
+          <a:p>
+            <a:r>
+              <a:rPr lang="en-US" dirty="0" err="1" smtClean="0">
+                <a:solidFill>
+                  <a:schemeClr val="tx1"/>
+                </a:solidFill>
+              </a:rPr>
+              <a:t>spi</a:t>
+            </a:r>
+            <a:endParaRPr lang="en-CA" dirty="0">
+              <a:solidFill>
+                <a:schemeClr val="tx1"/>
+              </a:solidFill>
+            </a:endParaRPr>
+          </a:p>
+        </p:txBody>
+      </p:sp>
+      <p:sp>
+        <p:nvSpPr>
+          <p:cNvPr id="18" name="Rectangle 17"/>
+          <p:cNvSpPr/>
+          <p:nvPr/>
+        </p:nvSpPr>
+        <p:spPr>
+          <a:xfrm>
+            <a:off x="9478891" y="2951863"/>
+            <a:ext cx="1377565" cy="392550"/>
+          </a:xfrm>
+          <a:prstGeom prst="rect">
+            <a:avLst/>
+          </a:prstGeom>
+          <a:solidFill>
+            <a:schemeClr val="bg1">
+              <a:lumMod val="65000"/>
+            </a:schemeClr>
+          </a:solidFill>
+          <a:ln>
+            <a:solidFill>
+              <a:schemeClr val="tx1"/>
+            </a:solidFill>
+          </a:ln>
+        </p:spPr>
+        <p:style>
+          <a:lnRef idx="2">
+            <a:schemeClr val="accent1">
+              <a:shade val="50000"/>
+            </a:schemeClr>
+          </a:lnRef>
+          <a:fillRef idx="1">
+            <a:schemeClr val="accent1"/>
+          </a:fillRef>
+          <a:effectRef idx="0">
+            <a:schemeClr val="accent1"/>
+          </a:effectRef>
+          <a:fontRef idx="minor">
+            <a:schemeClr val="lt1"/>
+          </a:fontRef>
+        </p:style>
+        <p:txBody>
+          <a:bodyPr rtlCol="0" anchor="t" anchorCtr="0"/>
+          <a:lstStyle/>
+          <a:p>
+            <a:r>
+              <a:rPr lang="en-US" dirty="0" err="1" smtClean="0">
+                <a:solidFill>
+                  <a:schemeClr val="tx1"/>
+                </a:solidFill>
+              </a:rPr>
+              <a:t>petitFatFS</a:t>
+            </a:r>
+            <a:endParaRPr lang="en-CA" dirty="0">
+              <a:solidFill>
+                <a:schemeClr val="tx1"/>
+              </a:solidFill>
+            </a:endParaRPr>
+          </a:p>
+        </p:txBody>
+      </p:sp>
+      <p:cxnSp>
+        <p:nvCxnSpPr>
+          <p:cNvPr id="24" name="Straight Arrow Connector 23"/>
+          <p:cNvCxnSpPr>
+            <a:stCxn id="9" idx="2"/>
+            <a:endCxn id="13" idx="0"/>
+          </p:cNvCxnSpPr>
+          <p:nvPr/>
+        </p:nvCxnSpPr>
+        <p:spPr>
+          <a:xfrm>
+            <a:off x="2788863" y="4200219"/>
+            <a:ext cx="1813045" cy="1368427"/>
+          </a:xfrm>
+          <a:prstGeom prst="straightConnector1">
+            <a:avLst/>
+          </a:prstGeom>
+          <a:ln>
+            <a:tailEnd type="triangle"/>
+          </a:ln>
+        </p:spPr>
+        <p:style>
+          <a:lnRef idx="1">
+            <a:schemeClr val="accent1"/>
+          </a:lnRef>
+          <a:fillRef idx="0">
+            <a:schemeClr val="accent1"/>
+          </a:fillRef>
+          <a:effectRef idx="0">
+            <a:schemeClr val="accent1"/>
+          </a:effectRef>
+          <a:fontRef idx="minor">
+            <a:schemeClr val="tx1"/>
+          </a:fontRef>
+        </p:style>
+      </p:cxnSp>
+      <p:cxnSp>
+        <p:nvCxnSpPr>
+          <p:cNvPr id="27" name="Straight Arrow Connector 26"/>
+          <p:cNvCxnSpPr>
+            <a:stCxn id="11" idx="2"/>
+            <a:endCxn id="13" idx="0"/>
+          </p:cNvCxnSpPr>
+          <p:nvPr/>
+        </p:nvCxnSpPr>
+        <p:spPr>
+          <a:xfrm flipH="1">
+            <a:off x="4601908" y="4200219"/>
+            <a:ext cx="571906" cy="1368427"/>
+          </a:xfrm>
+          <a:prstGeom prst="straightConnector1">
+            <a:avLst/>
+          </a:prstGeom>
+          <a:ln>
+            <a:tailEnd type="triangle"/>
+          </a:ln>
+        </p:spPr>
+        <p:style>
+          <a:lnRef idx="1">
+            <a:schemeClr val="accent1"/>
+          </a:lnRef>
+          <a:fillRef idx="0">
+            <a:schemeClr val="accent1"/>
+          </a:fillRef>
+          <a:effectRef idx="0">
+            <a:schemeClr val="accent1"/>
+          </a:effectRef>
+          <a:fontRef idx="minor">
+            <a:schemeClr val="tx1"/>
+          </a:fontRef>
+        </p:style>
+      </p:cxnSp>
+      <p:cxnSp>
+        <p:nvCxnSpPr>
+          <p:cNvPr id="30" name="Straight Arrow Connector 29"/>
+          <p:cNvCxnSpPr>
+            <a:stCxn id="9" idx="2"/>
+            <a:endCxn id="16" idx="0"/>
+          </p:cNvCxnSpPr>
+          <p:nvPr/>
+        </p:nvCxnSpPr>
+        <p:spPr>
+          <a:xfrm>
+            <a:off x="2788863" y="4200219"/>
+            <a:ext cx="124542" cy="1384329"/>
+          </a:xfrm>
+          <a:prstGeom prst="straightConnector1">
+            <a:avLst/>
+          </a:prstGeom>
+          <a:ln>
+            <a:tailEnd type="triangle"/>
+          </a:ln>
+        </p:spPr>
+        <p:style>
+          <a:lnRef idx="1">
+            <a:schemeClr val="accent1"/>
+          </a:lnRef>
+          <a:fillRef idx="0">
+            <a:schemeClr val="accent1"/>
+          </a:fillRef>
+          <a:effectRef idx="0">
+            <a:schemeClr val="accent1"/>
+          </a:effectRef>
+          <a:fontRef idx="minor">
+            <a:schemeClr val="tx1"/>
+          </a:fontRef>
+        </p:style>
+      </p:cxnSp>
+      <p:cxnSp>
+        <p:nvCxnSpPr>
+          <p:cNvPr id="39" name="Straight Arrow Connector 38"/>
+          <p:cNvCxnSpPr>
+            <a:stCxn id="10" idx="2"/>
+            <a:endCxn id="15" idx="0"/>
+          </p:cNvCxnSpPr>
+          <p:nvPr/>
+        </p:nvCxnSpPr>
+        <p:spPr>
+          <a:xfrm>
+            <a:off x="7640260" y="4200219"/>
+            <a:ext cx="280520" cy="1368427"/>
+          </a:xfrm>
+          <a:prstGeom prst="straightConnector1">
+            <a:avLst/>
+          </a:prstGeom>
+          <a:ln>
+            <a:tailEnd type="triangle"/>
+          </a:ln>
+        </p:spPr>
+        <p:style>
+          <a:lnRef idx="1">
+            <a:schemeClr val="accent1"/>
+          </a:lnRef>
+          <a:fillRef idx="0">
+            <a:schemeClr val="accent1"/>
+          </a:fillRef>
+          <a:effectRef idx="0">
+            <a:schemeClr val="accent1"/>
+          </a:effectRef>
+          <a:fontRef idx="minor">
+            <a:schemeClr val="tx1"/>
+          </a:fontRef>
+        </p:style>
+      </p:cxnSp>
+      <p:cxnSp>
+        <p:nvCxnSpPr>
+          <p:cNvPr id="43" name="Straight Arrow Connector 42"/>
+          <p:cNvCxnSpPr>
+            <a:stCxn id="13" idx="2"/>
+            <a:endCxn id="17" idx="0"/>
+          </p:cNvCxnSpPr>
+          <p:nvPr/>
+        </p:nvCxnSpPr>
+        <p:spPr>
+          <a:xfrm>
+            <a:off x="4601908" y="5961196"/>
+            <a:ext cx="4085680" cy="374470"/>
+          </a:xfrm>
+          <a:prstGeom prst="straightConnector1">
+            <a:avLst/>
+          </a:prstGeom>
+          <a:ln>
+            <a:tailEnd type="triangle"/>
+          </a:ln>
+        </p:spPr>
+        <p:style>
+          <a:lnRef idx="1">
+            <a:schemeClr val="accent1"/>
+          </a:lnRef>
+          <a:fillRef idx="0">
+            <a:schemeClr val="accent1"/>
+          </a:fillRef>
+          <a:effectRef idx="0">
+            <a:schemeClr val="accent1"/>
+          </a:effectRef>
+          <a:fontRef idx="minor">
+            <a:schemeClr val="tx1"/>
+          </a:fontRef>
+        </p:style>
+      </p:cxnSp>
+      <p:cxnSp>
+        <p:nvCxnSpPr>
+          <p:cNvPr id="46" name="Straight Arrow Connector 45"/>
+          <p:cNvCxnSpPr>
+            <a:stCxn id="18" idx="2"/>
+            <a:endCxn id="17" idx="0"/>
+          </p:cNvCxnSpPr>
+          <p:nvPr/>
+        </p:nvCxnSpPr>
+        <p:spPr>
+          <a:xfrm flipH="1">
+            <a:off x="8687588" y="3344413"/>
+            <a:ext cx="1480086" cy="2991253"/>
+          </a:xfrm>
+          <a:prstGeom prst="straightConnector1">
+            <a:avLst/>
+          </a:prstGeom>
+          <a:ln>
+            <a:tailEnd type="triangle"/>
+          </a:ln>
+        </p:spPr>
+        <p:style>
+          <a:lnRef idx="1">
+            <a:schemeClr val="accent1"/>
+          </a:lnRef>
+          <a:fillRef idx="0">
+            <a:schemeClr val="accent1"/>
+          </a:fillRef>
+          <a:effectRef idx="0">
+            <a:schemeClr val="accent1"/>
+          </a:effectRef>
+          <a:fontRef idx="minor">
+            <a:schemeClr val="tx1"/>
+          </a:fontRef>
+        </p:style>
+      </p:cxnSp>
+      <p:sp>
+        <p:nvSpPr>
+          <p:cNvPr id="55" name="Rectangular Callout 54"/>
+          <p:cNvSpPr/>
+          <p:nvPr/>
+        </p:nvSpPr>
+        <p:spPr>
+          <a:xfrm>
+            <a:off x="942990" y="6287851"/>
+            <a:ext cx="2090661" cy="574993"/>
+          </a:xfrm>
+          <a:prstGeom prst="wedgeRectCallout">
+            <a:avLst>
+              <a:gd name="adj1" fmla="val 30782"/>
+              <a:gd name="adj2" fmla="val -61075"/>
+            </a:avLst>
+          </a:prstGeom>
+          <a:solidFill>
+            <a:schemeClr val="accent6">
+              <a:lumMod val="20000"/>
+              <a:lumOff val="80000"/>
+            </a:schemeClr>
+          </a:solidFill>
+          <a:ln>
+            <a:solidFill>
+              <a:schemeClr val="tx1"/>
+            </a:solidFill>
+          </a:ln>
+        </p:spPr>
+        <p:style>
+          <a:lnRef idx="2">
+            <a:schemeClr val="accent1">
+              <a:shade val="50000"/>
+            </a:schemeClr>
+          </a:lnRef>
+          <a:fillRef idx="1">
+            <a:schemeClr val="accent1"/>
+          </a:fillRef>
+          <a:effectRef idx="0">
+            <a:schemeClr val="accent1"/>
+          </a:effectRef>
+          <a:fontRef idx="minor">
+            <a:schemeClr val="lt1"/>
+          </a:fontRef>
+        </p:style>
+        <p:txBody>
+          <a:bodyPr rtlCol="0" anchor="t" anchorCtr="0"/>
+          <a:lstStyle/>
+          <a:p>
+            <a:r>
+              <a:rPr lang="en-US" sz="1400" dirty="0" smtClean="0">
+                <a:solidFill>
+                  <a:schemeClr val="tx1"/>
+                </a:solidFill>
+              </a:rPr>
+              <a:t>Each resource module has </a:t>
+            </a:r>
+            <a:r>
+              <a:rPr lang="en-US" sz="1400" dirty="0" err="1" smtClean="0">
+                <a:solidFill>
+                  <a:schemeClr val="tx1"/>
+                </a:solidFill>
+              </a:rPr>
+              <a:t>XXXconfig.h</a:t>
+            </a:r>
+            <a:r>
+              <a:rPr lang="en-US" sz="1400" dirty="0" smtClean="0">
+                <a:solidFill>
+                  <a:schemeClr val="tx1"/>
+                </a:solidFill>
+              </a:rPr>
+              <a:t> for porting</a:t>
+            </a:r>
+            <a:endParaRPr lang="en-CA" sz="1400" dirty="0">
+              <a:solidFill>
+                <a:schemeClr val="tx1"/>
+              </a:solidFill>
+            </a:endParaRPr>
+          </a:p>
+        </p:txBody>
+      </p:sp>
+      <p:cxnSp>
+        <p:nvCxnSpPr>
+          <p:cNvPr id="59" name="Straight Arrow Connector 58"/>
+          <p:cNvCxnSpPr>
+            <a:stCxn id="44" idx="2"/>
+            <a:endCxn id="6" idx="0"/>
+          </p:cNvCxnSpPr>
+          <p:nvPr/>
+        </p:nvCxnSpPr>
+        <p:spPr>
+          <a:xfrm>
+            <a:off x="5299669" y="2312736"/>
+            <a:ext cx="4235" cy="374470"/>
+          </a:xfrm>
+          <a:prstGeom prst="straightConnector1">
+            <a:avLst/>
+          </a:prstGeom>
+          <a:ln>
+            <a:tailEnd type="triangle"/>
+          </a:ln>
+        </p:spPr>
+        <p:style>
+          <a:lnRef idx="1">
+            <a:schemeClr val="accent1"/>
+          </a:lnRef>
+          <a:fillRef idx="0">
+            <a:schemeClr val="accent1"/>
+          </a:fillRef>
+          <a:effectRef idx="0">
+            <a:schemeClr val="accent1"/>
+          </a:effectRef>
+          <a:fontRef idx="minor">
+            <a:schemeClr val="tx1"/>
+          </a:fontRef>
+        </p:style>
+      </p:cxnSp>
+      <p:sp>
+        <p:nvSpPr>
+          <p:cNvPr id="66" name="Rectangle 65"/>
+          <p:cNvSpPr/>
+          <p:nvPr/>
+        </p:nvSpPr>
+        <p:spPr>
+          <a:xfrm>
+            <a:off x="11150600" y="2943910"/>
+            <a:ext cx="790357" cy="392550"/>
+          </a:xfrm>
+          <a:prstGeom prst="rect">
+            <a:avLst/>
+          </a:prstGeom>
+          <a:solidFill>
+            <a:schemeClr val="bg1">
+              <a:lumMod val="65000"/>
+            </a:schemeClr>
+          </a:solidFill>
+          <a:ln>
+            <a:solidFill>
+              <a:schemeClr val="tx1"/>
+            </a:solidFill>
+          </a:ln>
+        </p:spPr>
+        <p:style>
+          <a:lnRef idx="2">
+            <a:schemeClr val="accent1">
+              <a:shade val="50000"/>
+            </a:schemeClr>
+          </a:lnRef>
+          <a:fillRef idx="1">
+            <a:schemeClr val="accent1"/>
+          </a:fillRef>
+          <a:effectRef idx="0">
+            <a:schemeClr val="accent1"/>
+          </a:effectRef>
+          <a:fontRef idx="minor">
+            <a:schemeClr val="lt1"/>
+          </a:fontRef>
+        </p:style>
+        <p:txBody>
+          <a:bodyPr rtlCol="0" anchor="t" anchorCtr="0"/>
+          <a:lstStyle/>
+          <a:p>
+            <a:r>
+              <a:rPr lang="en-US" dirty="0" smtClean="0">
+                <a:solidFill>
+                  <a:schemeClr val="tx1"/>
+                </a:solidFill>
+              </a:rPr>
+              <a:t>color</a:t>
+            </a:r>
+            <a:endParaRPr lang="en-CA" dirty="0">
+              <a:solidFill>
+                <a:schemeClr val="tx1"/>
+              </a:solidFill>
+            </a:endParaRPr>
+          </a:p>
+        </p:txBody>
+      </p:sp>
+      <p:sp>
+        <p:nvSpPr>
+          <p:cNvPr id="67" name="Rectangle 66"/>
+          <p:cNvSpPr/>
+          <p:nvPr/>
+        </p:nvSpPr>
+        <p:spPr>
+          <a:xfrm>
+            <a:off x="11147875" y="3607950"/>
+            <a:ext cx="790357" cy="392550"/>
+          </a:xfrm>
+          <a:prstGeom prst="rect">
+            <a:avLst/>
+          </a:prstGeom>
+          <a:solidFill>
+            <a:schemeClr val="bg1">
+              <a:lumMod val="65000"/>
+            </a:schemeClr>
+          </a:solidFill>
+          <a:ln>
+            <a:solidFill>
+              <a:schemeClr val="tx1"/>
+            </a:solidFill>
+          </a:ln>
+        </p:spPr>
+        <p:style>
+          <a:lnRef idx="2">
+            <a:schemeClr val="accent1">
+              <a:shade val="50000"/>
+            </a:schemeClr>
+          </a:lnRef>
+          <a:fillRef idx="1">
+            <a:schemeClr val="accent1"/>
+          </a:fillRef>
+          <a:effectRef idx="0">
+            <a:schemeClr val="accent1"/>
+          </a:effectRef>
+          <a:fontRef idx="minor">
+            <a:schemeClr val="lt1"/>
+          </a:fontRef>
+        </p:style>
+        <p:txBody>
+          <a:bodyPr rtlCol="0" anchor="t" anchorCtr="0"/>
+          <a:lstStyle/>
+          <a:p>
+            <a:r>
+              <a:rPr lang="en-US" dirty="0" smtClean="0">
+                <a:solidFill>
+                  <a:schemeClr val="tx1"/>
+                </a:solidFill>
+              </a:rPr>
+              <a:t>font</a:t>
+            </a:r>
+            <a:endParaRPr lang="en-CA" dirty="0">
+              <a:solidFill>
+                <a:schemeClr val="tx1"/>
+              </a:solidFill>
+            </a:endParaRPr>
+          </a:p>
+        </p:txBody>
+      </p:sp>
+      <p:sp>
+        <p:nvSpPr>
+          <p:cNvPr id="68" name="Rectangular Callout 67"/>
+          <p:cNvSpPr/>
+          <p:nvPr/>
+        </p:nvSpPr>
+        <p:spPr>
+          <a:xfrm>
+            <a:off x="498308" y="3336460"/>
+            <a:ext cx="1354258" cy="751126"/>
+          </a:xfrm>
+          <a:prstGeom prst="wedgeRectCallout">
+            <a:avLst>
+              <a:gd name="adj1" fmla="val 58337"/>
+              <a:gd name="adj2" fmla="val 82742"/>
+            </a:avLst>
+          </a:prstGeom>
+          <a:solidFill>
+            <a:schemeClr val="accent6">
+              <a:lumMod val="20000"/>
+              <a:lumOff val="80000"/>
+            </a:schemeClr>
+          </a:solidFill>
+          <a:ln>
+            <a:solidFill>
+              <a:schemeClr val="tx1"/>
+            </a:solidFill>
+          </a:ln>
+        </p:spPr>
+        <p:style>
+          <a:lnRef idx="2">
+            <a:schemeClr val="accent1">
+              <a:shade val="50000"/>
+            </a:schemeClr>
+          </a:lnRef>
+          <a:fillRef idx="1">
+            <a:schemeClr val="accent1"/>
+          </a:fillRef>
+          <a:effectRef idx="0">
+            <a:schemeClr val="accent1"/>
+          </a:effectRef>
+          <a:fontRef idx="minor">
+            <a:schemeClr val="lt1"/>
+          </a:fontRef>
+        </p:style>
+        <p:txBody>
+          <a:bodyPr rtlCol="0" anchor="t" anchorCtr="0"/>
+          <a:lstStyle/>
+          <a:p>
+            <a:r>
+              <a:rPr lang="en-US" sz="1400" dirty="0" err="1" smtClean="0">
+                <a:solidFill>
+                  <a:schemeClr val="tx1"/>
+                </a:solidFill>
+              </a:rPr>
+              <a:t>myRetarget.h</a:t>
+            </a:r>
+            <a:endParaRPr lang="en-US" sz="1400" dirty="0" smtClean="0">
+              <a:solidFill>
+                <a:schemeClr val="tx1"/>
+              </a:solidFill>
+            </a:endParaRPr>
+          </a:p>
+          <a:p>
+            <a:r>
+              <a:rPr lang="en-US" sz="1400" dirty="0" smtClean="0">
+                <a:solidFill>
+                  <a:schemeClr val="tx1"/>
+                </a:solidFill>
+              </a:rPr>
+              <a:t>switches which resource to use</a:t>
+            </a:r>
+            <a:endParaRPr lang="en-CA" sz="1400" dirty="0">
+              <a:solidFill>
+                <a:schemeClr val="tx1"/>
+              </a:solidFill>
+            </a:endParaRPr>
+          </a:p>
+        </p:txBody>
+      </p:sp>
+      <p:sp>
+        <p:nvSpPr>
+          <p:cNvPr id="69" name="Rectangle 68"/>
+          <p:cNvSpPr/>
+          <p:nvPr/>
+        </p:nvSpPr>
+        <p:spPr>
+          <a:xfrm>
+            <a:off x="9103071" y="2293923"/>
+            <a:ext cx="1006429" cy="461665"/>
+          </a:xfrm>
+          <a:prstGeom prst="rect">
+            <a:avLst/>
+          </a:prstGeom>
+        </p:spPr>
+        <p:txBody>
+          <a:bodyPr wrap="none">
+            <a:spAutoFit/>
+          </a:bodyPr>
+          <a:lstStyle/>
+          <a:p>
+            <a:r>
+              <a:rPr lang="en-US" sz="2400" b="1" dirty="0" smtClean="0">
+                <a:solidFill>
+                  <a:schemeClr val="accent1">
+                    <a:lumMod val="50000"/>
+                  </a:schemeClr>
+                </a:solidFill>
+              </a:rPr>
+              <a:t>others</a:t>
+            </a:r>
+            <a:endParaRPr lang="en-CA" sz="2400" b="1" dirty="0">
+              <a:solidFill>
+                <a:schemeClr val="accent1">
+                  <a:lumMod val="50000"/>
+                </a:schemeClr>
+              </a:solidFill>
+            </a:endParaRPr>
+          </a:p>
+        </p:txBody>
+      </p:sp>
+      <p:sp>
+        <p:nvSpPr>
+          <p:cNvPr id="70" name="Up-Down Arrow 69"/>
+          <p:cNvSpPr/>
+          <p:nvPr/>
+        </p:nvSpPr>
+        <p:spPr>
+          <a:xfrm>
+            <a:off x="81643" y="4991169"/>
+            <a:ext cx="213401" cy="1866831"/>
+          </a:xfrm>
+          <a:prstGeom prst="upDownArrow">
+            <a:avLst/>
+          </a:prstGeom>
+          <a:solidFill>
+            <a:schemeClr val="accent4">
+              <a:lumMod val="40000"/>
+              <a:lumOff val="60000"/>
+            </a:schemeClr>
+          </a:solidFill>
+          <a:ln>
+            <a:solidFill>
+              <a:schemeClr val="tx1"/>
+            </a:solidFill>
+          </a:ln>
+        </p:spPr>
+        <p:style>
+          <a:lnRef idx="2">
+            <a:schemeClr val="accent1">
+              <a:shade val="50000"/>
+            </a:schemeClr>
+          </a:lnRef>
+          <a:fillRef idx="1">
+            <a:schemeClr val="accent1"/>
+          </a:fillRef>
+          <a:effectRef idx="0">
+            <a:schemeClr val="accent1"/>
+          </a:effectRef>
+          <a:fontRef idx="minor">
+            <a:schemeClr val="lt1"/>
+          </a:fontRef>
+        </p:style>
+        <p:txBody>
+          <a:bodyPr rtlCol="0" anchor="ctr"/>
+          <a:lstStyle/>
+          <a:p>
+            <a:pPr algn="ctr"/>
+            <a:endParaRPr lang="en-CA"/>
+          </a:p>
+        </p:txBody>
+      </p:sp>
+      <p:sp>
+        <p:nvSpPr>
+          <p:cNvPr id="71" name="Up-Down Arrow 70"/>
+          <p:cNvSpPr/>
+          <p:nvPr/>
+        </p:nvSpPr>
+        <p:spPr>
+          <a:xfrm>
+            <a:off x="81644" y="2438710"/>
+            <a:ext cx="190886" cy="2552460"/>
+          </a:xfrm>
+          <a:prstGeom prst="upDownArrow">
+            <a:avLst/>
+          </a:prstGeom>
+          <a:solidFill>
+            <a:schemeClr val="accent4">
+              <a:lumMod val="40000"/>
+              <a:lumOff val="60000"/>
+            </a:schemeClr>
+          </a:solidFill>
+          <a:ln>
+            <a:solidFill>
+              <a:schemeClr val="tx1"/>
+            </a:solidFill>
+          </a:ln>
+        </p:spPr>
+        <p:style>
+          <a:lnRef idx="2">
+            <a:schemeClr val="accent1">
+              <a:shade val="50000"/>
+            </a:schemeClr>
+          </a:lnRef>
+          <a:fillRef idx="1">
+            <a:schemeClr val="accent1"/>
+          </a:fillRef>
+          <a:effectRef idx="0">
+            <a:schemeClr val="accent1"/>
+          </a:effectRef>
+          <a:fontRef idx="minor">
+            <a:schemeClr val="lt1"/>
+          </a:fontRef>
+        </p:style>
+        <p:txBody>
+          <a:bodyPr rtlCol="0" anchor="ctr"/>
+          <a:lstStyle/>
+          <a:p>
+            <a:pPr algn="ctr"/>
+            <a:endParaRPr lang="en-CA"/>
+          </a:p>
+        </p:txBody>
+      </p:sp>
+      <p:sp>
+        <p:nvSpPr>
+          <p:cNvPr id="72" name="Up-Down Arrow 71"/>
+          <p:cNvSpPr/>
+          <p:nvPr/>
+        </p:nvSpPr>
+        <p:spPr>
+          <a:xfrm>
+            <a:off x="79343" y="1273865"/>
+            <a:ext cx="215701" cy="1164844"/>
+          </a:xfrm>
+          <a:prstGeom prst="upDownArrow">
+            <a:avLst/>
+          </a:prstGeom>
+          <a:solidFill>
+            <a:schemeClr val="accent4">
+              <a:lumMod val="40000"/>
+              <a:lumOff val="60000"/>
+            </a:schemeClr>
+          </a:solidFill>
+          <a:ln>
+            <a:solidFill>
+              <a:schemeClr val="tx1"/>
+            </a:solidFill>
+          </a:ln>
+        </p:spPr>
+        <p:style>
+          <a:lnRef idx="2">
+            <a:schemeClr val="accent1">
+              <a:shade val="50000"/>
+            </a:schemeClr>
+          </a:lnRef>
+          <a:fillRef idx="1">
+            <a:schemeClr val="accent1"/>
+          </a:fillRef>
+          <a:effectRef idx="0">
+            <a:schemeClr val="accent1"/>
+          </a:effectRef>
+          <a:fontRef idx="minor">
+            <a:schemeClr val="lt1"/>
+          </a:fontRef>
+        </p:style>
+        <p:txBody>
+          <a:bodyPr rtlCol="0" anchor="ctr"/>
+          <a:lstStyle/>
+          <a:p>
+            <a:pPr algn="ctr"/>
+            <a:endParaRPr lang="en-CA"/>
+          </a:p>
+        </p:txBody>
+      </p:sp>
+      <p:sp>
+        <p:nvSpPr>
+          <p:cNvPr id="73" name="Rectangle 72"/>
+          <p:cNvSpPr/>
+          <p:nvPr/>
+        </p:nvSpPr>
+        <p:spPr>
+          <a:xfrm>
+            <a:off x="220087" y="1673496"/>
+            <a:ext cx="996170" cy="338554"/>
+          </a:xfrm>
+          <a:prstGeom prst="rect">
+            <a:avLst/>
+          </a:prstGeom>
+        </p:spPr>
+        <p:txBody>
+          <a:bodyPr wrap="none">
+            <a:spAutoFit/>
+          </a:bodyPr>
+          <a:lstStyle/>
+          <a:p>
+            <a:r>
+              <a:rPr lang="en-US" sz="1600" b="1" dirty="0" smtClean="0">
+                <a:solidFill>
+                  <a:srgbClr val="FF0000"/>
+                </a:solidFill>
+              </a:rPr>
+              <a:t>App layer</a:t>
+            </a:r>
+            <a:endParaRPr lang="en-CA" sz="1600" b="1" dirty="0">
+              <a:solidFill>
+                <a:srgbClr val="FF0000"/>
+              </a:solidFill>
+            </a:endParaRPr>
+          </a:p>
+        </p:txBody>
+      </p:sp>
+      <p:sp>
+        <p:nvSpPr>
+          <p:cNvPr id="74" name="Rectangle 73"/>
+          <p:cNvSpPr/>
+          <p:nvPr/>
+        </p:nvSpPr>
+        <p:spPr>
+          <a:xfrm>
+            <a:off x="200659" y="2704603"/>
+            <a:ext cx="1049903" cy="338554"/>
+          </a:xfrm>
+          <a:prstGeom prst="rect">
+            <a:avLst/>
+          </a:prstGeom>
+        </p:spPr>
+        <p:txBody>
+          <a:bodyPr wrap="none">
+            <a:spAutoFit/>
+          </a:bodyPr>
+          <a:lstStyle/>
+          <a:p>
+            <a:r>
+              <a:rPr lang="en-US" sz="1600" b="1" dirty="0" smtClean="0">
+                <a:solidFill>
+                  <a:srgbClr val="FF0000"/>
+                </a:solidFill>
+              </a:rPr>
+              <a:t>Infra layer</a:t>
+            </a:r>
+            <a:endParaRPr lang="en-CA" sz="1600" b="1" dirty="0">
+              <a:solidFill>
+                <a:srgbClr val="FF0000"/>
+              </a:solidFill>
+            </a:endParaRPr>
+          </a:p>
+        </p:txBody>
+      </p:sp>
+      <p:sp>
+        <p:nvSpPr>
+          <p:cNvPr id="76" name="Rectangle 75"/>
+          <p:cNvSpPr/>
+          <p:nvPr/>
+        </p:nvSpPr>
+        <p:spPr>
+          <a:xfrm>
+            <a:off x="249415" y="5074758"/>
+            <a:ext cx="1427891" cy="338554"/>
+          </a:xfrm>
+          <a:prstGeom prst="rect">
+            <a:avLst/>
+          </a:prstGeom>
+        </p:spPr>
+        <p:txBody>
+          <a:bodyPr wrap="none">
+            <a:spAutoFit/>
+          </a:bodyPr>
+          <a:lstStyle/>
+          <a:p>
+            <a:r>
+              <a:rPr lang="en-US" sz="1600" b="1" dirty="0" smtClean="0">
+                <a:solidFill>
+                  <a:srgbClr val="FF0000"/>
+                </a:solidFill>
+              </a:rPr>
+              <a:t>Resource layer</a:t>
+            </a:r>
+            <a:endParaRPr lang="en-CA" sz="1600" b="1" dirty="0">
+              <a:solidFill>
+                <a:srgbClr val="FF0000"/>
+              </a:solidFill>
+            </a:endParaRPr>
+          </a:p>
+        </p:txBody>
+      </p:sp>
+      <p:sp>
+        <p:nvSpPr>
+          <p:cNvPr id="78" name="Title 1"/>
+          <p:cNvSpPr txBox="1">
+            <a:spLocks/>
+          </p:cNvSpPr>
+          <p:nvPr/>
+        </p:nvSpPr>
+        <p:spPr>
+          <a:xfrm>
+            <a:off x="416138" y="239195"/>
+            <a:ext cx="10515600" cy="839440"/>
+          </a:xfrm>
+          <a:prstGeom prst="rect">
+            <a:avLst/>
+          </a:prstGeom>
+        </p:spPr>
+        <p:txBody>
+          <a:bodyPr vert="horz" lIns="91440" tIns="45720" rIns="91440" bIns="45720" rtlCol="0" anchor="b">
+            <a:normAutofit fontScale="92500" lnSpcReduction="10000"/>
+          </a:bodyPr>
+          <a:lstStyle>
+            <a:lvl1pPr algn="ctr" defTabSz="914400" rtl="0" eaLnBrk="1" latinLnBrk="0" hangingPunct="1">
+              <a:lnSpc>
+                <a:spcPct val="90000"/>
+              </a:lnSpc>
+              <a:spcBef>
+                <a:spcPct val="0"/>
+              </a:spcBef>
+              <a:buNone/>
+              <a:defRPr sz="6000" kern="1200">
+                <a:solidFill>
+                  <a:schemeClr val="tx1"/>
+                </a:solidFill>
+                <a:latin typeface="+mj-lt"/>
+                <a:ea typeface="+mj-ea"/>
+                <a:cs typeface="+mj-cs"/>
+              </a:defRPr>
+            </a:lvl1pPr>
+          </a:lstStyle>
+          <a:p>
+            <a:pPr algn="l"/>
+            <a:r>
+              <a:rPr lang="en-US" dirty="0" smtClean="0"/>
+              <a:t>Software Structure</a:t>
+            </a:r>
+            <a:endParaRPr lang="en-CA" dirty="0"/>
+          </a:p>
+        </p:txBody>
+      </p:sp>
+      <p:sp>
+        <p:nvSpPr>
+          <p:cNvPr id="41" name="Rectangle 40"/>
+          <p:cNvSpPr/>
+          <p:nvPr/>
+        </p:nvSpPr>
+        <p:spPr>
+          <a:xfrm>
+            <a:off x="6365674" y="1052350"/>
+            <a:ext cx="471504" cy="346549"/>
+          </a:xfrm>
+          <a:prstGeom prst="rect">
+            <a:avLst/>
+          </a:prstGeom>
+          <a:solidFill>
+            <a:schemeClr val="accent4">
+              <a:lumMod val="20000"/>
+              <a:lumOff val="80000"/>
+            </a:schemeClr>
+          </a:solidFill>
+          <a:ln>
+            <a:solidFill>
+              <a:schemeClr val="tx1"/>
+            </a:solidFill>
+          </a:ln>
+        </p:spPr>
+        <p:style>
+          <a:lnRef idx="2">
+            <a:schemeClr val="accent1">
+              <a:shade val="50000"/>
+            </a:schemeClr>
+          </a:lnRef>
+          <a:fillRef idx="1">
+            <a:schemeClr val="accent1"/>
+          </a:fillRef>
+          <a:effectRef idx="0">
+            <a:schemeClr val="accent1"/>
+          </a:effectRef>
+          <a:fontRef idx="minor">
+            <a:schemeClr val="lt1"/>
+          </a:fontRef>
+        </p:style>
+        <p:txBody>
+          <a:bodyPr rtlCol="0" anchor="t" anchorCtr="0"/>
+          <a:lstStyle/>
+          <a:p>
+            <a:endParaRPr lang="en-CA" dirty="0">
+              <a:solidFill>
+                <a:schemeClr val="tx1"/>
+              </a:solidFill>
+            </a:endParaRPr>
+          </a:p>
+        </p:txBody>
+      </p:sp>
+      <p:sp>
+        <p:nvSpPr>
+          <p:cNvPr id="42" name="Rectangle 41"/>
+          <p:cNvSpPr/>
+          <p:nvPr/>
+        </p:nvSpPr>
+        <p:spPr>
+          <a:xfrm>
+            <a:off x="7002657" y="921138"/>
+            <a:ext cx="827471" cy="461665"/>
+          </a:xfrm>
+          <a:prstGeom prst="rect">
+            <a:avLst/>
+          </a:prstGeom>
+        </p:spPr>
+        <p:txBody>
+          <a:bodyPr wrap="none">
+            <a:spAutoFit/>
+          </a:bodyPr>
+          <a:lstStyle/>
+          <a:p>
+            <a:r>
+              <a:rPr lang="en-US" sz="2400" b="1" dirty="0" smtClean="0">
+                <a:solidFill>
+                  <a:schemeClr val="accent1">
+                    <a:lumMod val="50000"/>
+                  </a:schemeClr>
+                </a:solidFill>
+              </a:rPr>
+              <a:t>main</a:t>
+            </a:r>
+            <a:endParaRPr lang="en-CA" sz="2400" b="1" dirty="0">
+              <a:solidFill>
+                <a:schemeClr val="accent1">
+                  <a:lumMod val="50000"/>
+                </a:schemeClr>
+              </a:solidFill>
+            </a:endParaRPr>
+          </a:p>
+        </p:txBody>
+      </p:sp>
+      <p:sp>
+        <p:nvSpPr>
+          <p:cNvPr id="44" name="Rectangle 43"/>
+          <p:cNvSpPr/>
+          <p:nvPr/>
+        </p:nvSpPr>
+        <p:spPr>
+          <a:xfrm>
+            <a:off x="4245426" y="1713068"/>
+            <a:ext cx="2108485" cy="599668"/>
+          </a:xfrm>
+          <a:prstGeom prst="rect">
+            <a:avLst/>
+          </a:prstGeom>
+          <a:solidFill>
+            <a:schemeClr val="accent4">
+              <a:lumMod val="20000"/>
+              <a:lumOff val="80000"/>
+            </a:schemeClr>
+          </a:solidFill>
+          <a:ln>
+            <a:solidFill>
+              <a:schemeClr val="tx1"/>
+            </a:solidFill>
+          </a:ln>
+        </p:spPr>
+        <p:style>
+          <a:lnRef idx="2">
+            <a:schemeClr val="accent1">
+              <a:shade val="50000"/>
+            </a:schemeClr>
+          </a:lnRef>
+          <a:fillRef idx="1">
+            <a:schemeClr val="accent1"/>
+          </a:fillRef>
+          <a:effectRef idx="0">
+            <a:schemeClr val="accent1"/>
+          </a:effectRef>
+          <a:fontRef idx="minor">
+            <a:schemeClr val="lt1"/>
+          </a:fontRef>
+        </p:style>
+        <p:txBody>
+          <a:bodyPr rtlCol="0" anchor="t" anchorCtr="0"/>
+          <a:lstStyle/>
+          <a:p>
+            <a:endParaRPr lang="en-CA" dirty="0">
+              <a:solidFill>
+                <a:schemeClr val="tx1"/>
+              </a:solidFill>
+            </a:endParaRPr>
+          </a:p>
+        </p:txBody>
+      </p:sp>
+      <p:sp>
+        <p:nvSpPr>
+          <p:cNvPr id="45" name="Rectangle 44"/>
+          <p:cNvSpPr/>
+          <p:nvPr/>
+        </p:nvSpPr>
+        <p:spPr>
+          <a:xfrm>
+            <a:off x="6435155" y="1772892"/>
+            <a:ext cx="1606658" cy="461665"/>
+          </a:xfrm>
+          <a:prstGeom prst="rect">
+            <a:avLst/>
+          </a:prstGeom>
+        </p:spPr>
+        <p:txBody>
+          <a:bodyPr wrap="none">
+            <a:spAutoFit/>
+          </a:bodyPr>
+          <a:lstStyle/>
+          <a:p>
+            <a:r>
+              <a:rPr lang="en-US" sz="2400" b="1" dirty="0" smtClean="0">
+                <a:solidFill>
+                  <a:schemeClr val="accent1">
+                    <a:lumMod val="50000"/>
+                  </a:schemeClr>
+                </a:solidFill>
+              </a:rPr>
+              <a:t>application</a:t>
+            </a:r>
+            <a:endParaRPr lang="en-CA" sz="2400" b="1" dirty="0">
+              <a:solidFill>
+                <a:schemeClr val="accent1">
+                  <a:lumMod val="50000"/>
+                </a:schemeClr>
+              </a:solidFill>
+            </a:endParaRPr>
+          </a:p>
+        </p:txBody>
+      </p:sp>
+      <p:sp>
+        <p:nvSpPr>
+          <p:cNvPr id="47" name="Rectangular Callout 46"/>
+          <p:cNvSpPr/>
+          <p:nvPr/>
+        </p:nvSpPr>
+        <p:spPr>
+          <a:xfrm>
+            <a:off x="8380300" y="661353"/>
+            <a:ext cx="1561888" cy="668141"/>
+          </a:xfrm>
+          <a:prstGeom prst="wedgeRectCallout">
+            <a:avLst>
+              <a:gd name="adj1" fmla="val -78093"/>
+              <a:gd name="adj2" fmla="val 24034"/>
+            </a:avLst>
+          </a:prstGeom>
+          <a:solidFill>
+            <a:schemeClr val="accent6">
+              <a:lumMod val="20000"/>
+              <a:lumOff val="80000"/>
+            </a:schemeClr>
+          </a:solidFill>
+          <a:ln>
+            <a:solidFill>
+              <a:schemeClr val="tx1"/>
+            </a:solidFill>
+          </a:ln>
+        </p:spPr>
+        <p:style>
+          <a:lnRef idx="2">
+            <a:schemeClr val="accent1">
+              <a:shade val="50000"/>
+            </a:schemeClr>
+          </a:lnRef>
+          <a:fillRef idx="1">
+            <a:schemeClr val="accent1"/>
+          </a:fillRef>
+          <a:effectRef idx="0">
+            <a:schemeClr val="accent1"/>
+          </a:effectRef>
+          <a:fontRef idx="minor">
+            <a:schemeClr val="lt1"/>
+          </a:fontRef>
+        </p:style>
+        <p:txBody>
+          <a:bodyPr rtlCol="0" anchor="t" anchorCtr="0"/>
+          <a:lstStyle/>
+          <a:p>
+            <a:r>
+              <a:rPr lang="en-US" sz="1600" dirty="0" smtClean="0">
+                <a:solidFill>
+                  <a:schemeClr val="tx1"/>
+                </a:solidFill>
+              </a:rPr>
+              <a:t>Call application to run</a:t>
+            </a:r>
+            <a:endParaRPr lang="en-CA" sz="1600" dirty="0">
+              <a:solidFill>
+                <a:schemeClr val="tx1"/>
+              </a:solidFill>
+            </a:endParaRPr>
+          </a:p>
+        </p:txBody>
+      </p:sp>
+      <p:cxnSp>
+        <p:nvCxnSpPr>
+          <p:cNvPr id="48" name="Straight Arrow Connector 47"/>
+          <p:cNvCxnSpPr>
+            <a:stCxn id="41" idx="2"/>
+            <a:endCxn id="44" idx="0"/>
+          </p:cNvCxnSpPr>
+          <p:nvPr/>
+        </p:nvCxnSpPr>
+        <p:spPr>
+          <a:xfrm flipH="1">
+            <a:off x="5299669" y="1398899"/>
+            <a:ext cx="1301757" cy="314169"/>
+          </a:xfrm>
+          <a:prstGeom prst="straightConnector1">
+            <a:avLst/>
+          </a:prstGeom>
+          <a:ln>
+            <a:tailEnd type="triangle"/>
+          </a:ln>
+        </p:spPr>
+        <p:style>
+          <a:lnRef idx="1">
+            <a:schemeClr val="accent1"/>
+          </a:lnRef>
+          <a:fillRef idx="0">
+            <a:schemeClr val="accent1"/>
+          </a:fillRef>
+          <a:effectRef idx="0">
+            <a:schemeClr val="accent1"/>
+          </a:effectRef>
+          <a:fontRef idx="minor">
+            <a:schemeClr val="tx1"/>
+          </a:fontRef>
+        </p:style>
+      </p:cxnSp>
+      <p:sp>
+        <p:nvSpPr>
+          <p:cNvPr id="49" name="Rectangular Callout 48"/>
+          <p:cNvSpPr/>
+          <p:nvPr/>
+        </p:nvSpPr>
+        <p:spPr>
+          <a:xfrm>
+            <a:off x="8582284" y="1548850"/>
+            <a:ext cx="1817411" cy="668141"/>
+          </a:xfrm>
+          <a:prstGeom prst="wedgeRectCallout">
+            <a:avLst>
+              <a:gd name="adj1" fmla="val -73152"/>
+              <a:gd name="adj2" fmla="val 20368"/>
+            </a:avLst>
+          </a:prstGeom>
+          <a:solidFill>
+            <a:schemeClr val="accent6">
+              <a:lumMod val="20000"/>
+              <a:lumOff val="80000"/>
+            </a:schemeClr>
+          </a:solidFill>
+          <a:ln>
+            <a:solidFill>
+              <a:schemeClr val="tx1"/>
+            </a:solidFill>
+          </a:ln>
+        </p:spPr>
+        <p:style>
+          <a:lnRef idx="2">
+            <a:schemeClr val="accent1">
+              <a:shade val="50000"/>
+            </a:schemeClr>
+          </a:lnRef>
+          <a:fillRef idx="1">
+            <a:schemeClr val="accent1"/>
+          </a:fillRef>
+          <a:effectRef idx="0">
+            <a:schemeClr val="accent1"/>
+          </a:effectRef>
+          <a:fontRef idx="minor">
+            <a:schemeClr val="lt1"/>
+          </a:fontRef>
+        </p:style>
+        <p:txBody>
+          <a:bodyPr rtlCol="0" anchor="t" anchorCtr="0"/>
+          <a:lstStyle/>
+          <a:p>
+            <a:r>
+              <a:rPr lang="en-US" sz="1600" dirty="0" smtClean="0">
+                <a:solidFill>
+                  <a:schemeClr val="tx1"/>
+                </a:solidFill>
+              </a:rPr>
+              <a:t>User level software goes here</a:t>
+            </a:r>
+            <a:endParaRPr lang="en-CA" sz="1600" dirty="0">
+              <a:solidFill>
+                <a:schemeClr val="tx1"/>
+              </a:solidFill>
+            </a:endParaRPr>
+          </a:p>
+        </p:txBody>
+      </p:sp>
+      <p:sp>
+        <p:nvSpPr>
+          <p:cNvPr id="50" name="Rectangle 49"/>
+          <p:cNvSpPr/>
+          <p:nvPr/>
+        </p:nvSpPr>
+        <p:spPr>
+          <a:xfrm>
+            <a:off x="4394603" y="1827289"/>
+            <a:ext cx="1381288" cy="392550"/>
+          </a:xfrm>
+          <a:prstGeom prst="rect">
+            <a:avLst/>
+          </a:prstGeom>
+          <a:solidFill>
+            <a:schemeClr val="accent2">
+              <a:lumMod val="40000"/>
+              <a:lumOff val="60000"/>
+            </a:schemeClr>
+          </a:solidFill>
+          <a:ln>
+            <a:solidFill>
+              <a:schemeClr val="tx1"/>
+            </a:solidFill>
+          </a:ln>
+        </p:spPr>
+        <p:style>
+          <a:lnRef idx="2">
+            <a:schemeClr val="accent1">
+              <a:shade val="50000"/>
+            </a:schemeClr>
+          </a:lnRef>
+          <a:fillRef idx="1">
+            <a:schemeClr val="accent1"/>
+          </a:fillRef>
+          <a:effectRef idx="0">
+            <a:schemeClr val="accent1"/>
+          </a:effectRef>
+          <a:fontRef idx="minor">
+            <a:schemeClr val="lt1"/>
+          </a:fontRef>
+        </p:style>
+        <p:txBody>
+          <a:bodyPr rtlCol="0" anchor="t" anchorCtr="0"/>
+          <a:lstStyle/>
+          <a:p>
+            <a:r>
+              <a:rPr lang="en-US" dirty="0" err="1" smtClean="0">
+                <a:solidFill>
+                  <a:schemeClr val="tx1"/>
+                </a:solidFill>
+              </a:rPr>
+              <a:t>tinyDisplay</a:t>
+            </a:r>
+            <a:endParaRPr lang="en-CA" dirty="0">
+              <a:solidFill>
+                <a:schemeClr val="tx1"/>
+              </a:solidFill>
+            </a:endParaRPr>
+          </a:p>
+        </p:txBody>
+      </p:sp>
+    </p:spTree>
+    <p:extLst>
+      <p:ext uri="{BB962C8B-B14F-4D97-AF65-F5344CB8AC3E}">
+        <p14:creationId xmlns:p14="http://schemas.microsoft.com/office/powerpoint/2010/main" val="3211786239"/>
+      </p:ext>
+    </p:extLst>
+  </p:cSld>
+  <p:clrMapOvr>
+    <a:masterClrMapping/>
+  </p:clrMapOvr>
+</p:sld>
+</file>
+
+<file path=ppt/slides/slide3.xml><?xml version="1.0" encoding="utf-8"?>
+<p:sld xmlns:a="http://schemas.openxmlformats.org/drawingml/2006/main" xmlns:r="http://schemas.openxmlformats.org/officeDocument/2006/relationships" xmlns:p="http://schemas.openxmlformats.org/presentationml/2006/main">
+  <p:cSld>
+    <p:spTree>
+      <p:nvGrpSpPr>
+        <p:cNvPr id="1" name=""/>
+        <p:cNvGrpSpPr/>
+        <p:nvPr/>
+      </p:nvGrpSpPr>
+      <p:grpSpPr>
+        <a:xfrm>
+          <a:off x="0" y="0"/>
+          <a:ext cx="0" cy="0"/>
+          <a:chOff x="0" y="0"/>
+          <a:chExt cx="0" cy="0"/>
+        </a:xfrm>
+      </p:grpSpPr>
+      <p:sp>
+        <p:nvSpPr>
+          <p:cNvPr id="64" name="Rectangle 63"/>
+          <p:cNvSpPr/>
+          <p:nvPr/>
+        </p:nvSpPr>
+        <p:spPr>
+          <a:xfrm>
+            <a:off x="9337656" y="2687206"/>
+            <a:ext cx="2818965" cy="1908071"/>
+          </a:xfrm>
+          <a:prstGeom prst="rect">
+            <a:avLst/>
+          </a:prstGeom>
+          <a:solidFill>
+            <a:schemeClr val="accent4">
+              <a:lumMod val="20000"/>
+              <a:lumOff val="80000"/>
+            </a:schemeClr>
+          </a:solidFill>
+          <a:ln>
+            <a:solidFill>
+              <a:schemeClr val="tx1"/>
+            </a:solidFill>
+          </a:ln>
+        </p:spPr>
+        <p:style>
+          <a:lnRef idx="2">
+            <a:schemeClr val="accent1">
+              <a:shade val="50000"/>
+            </a:schemeClr>
+          </a:lnRef>
+          <a:fillRef idx="1">
+            <a:schemeClr val="accent1"/>
+          </a:fillRef>
+          <a:effectRef idx="0">
+            <a:schemeClr val="accent1"/>
+          </a:effectRef>
+          <a:fontRef idx="minor">
+            <a:schemeClr val="lt1"/>
+          </a:fontRef>
+        </p:style>
+        <p:txBody>
+          <a:bodyPr rtlCol="0" anchor="t" anchorCtr="0"/>
+          <a:lstStyle/>
+          <a:p>
+            <a:endParaRPr lang="en-CA" dirty="0">
+              <a:solidFill>
+                <a:schemeClr val="tx1"/>
+              </a:solidFill>
+            </a:endParaRPr>
+          </a:p>
+        </p:txBody>
+      </p:sp>
+      <p:sp>
+        <p:nvSpPr>
+          <p:cNvPr id="5" name="Rectangle 4"/>
+          <p:cNvSpPr/>
+          <p:nvPr/>
+        </p:nvSpPr>
+        <p:spPr>
+          <a:xfrm>
+            <a:off x="6365674" y="1052350"/>
+            <a:ext cx="471504" cy="346549"/>
+          </a:xfrm>
+          <a:prstGeom prst="rect">
+            <a:avLst/>
+          </a:prstGeom>
+          <a:solidFill>
+            <a:schemeClr val="accent4">
+              <a:lumMod val="20000"/>
+              <a:lumOff val="80000"/>
+            </a:schemeClr>
+          </a:solidFill>
+          <a:ln>
+            <a:solidFill>
+              <a:schemeClr val="tx1"/>
+            </a:solidFill>
+          </a:ln>
+        </p:spPr>
+        <p:style>
+          <a:lnRef idx="2">
+            <a:schemeClr val="accent1">
+              <a:shade val="50000"/>
+            </a:schemeClr>
+          </a:lnRef>
+          <a:fillRef idx="1">
+            <a:schemeClr val="accent1"/>
+          </a:fillRef>
+          <a:effectRef idx="0">
+            <a:schemeClr val="accent1"/>
+          </a:effectRef>
+          <a:fontRef idx="minor">
+            <a:schemeClr val="lt1"/>
+          </a:fontRef>
+        </p:style>
+        <p:txBody>
+          <a:bodyPr rtlCol="0" anchor="t" anchorCtr="0"/>
+          <a:lstStyle/>
+          <a:p>
+            <a:endParaRPr lang="en-CA" dirty="0">
+              <a:solidFill>
+                <a:schemeClr val="tx1"/>
+              </a:solidFill>
+            </a:endParaRPr>
+          </a:p>
+        </p:txBody>
+      </p:sp>
+      <p:sp>
+        <p:nvSpPr>
+          <p:cNvPr id="6" name="Rectangle 5"/>
+          <p:cNvSpPr/>
+          <p:nvPr/>
+        </p:nvSpPr>
+        <p:spPr>
+          <a:xfrm>
+            <a:off x="1790309" y="2687206"/>
+            <a:ext cx="7027190" cy="1908071"/>
+          </a:xfrm>
+          <a:prstGeom prst="rect">
+            <a:avLst/>
+          </a:prstGeom>
+          <a:solidFill>
+            <a:schemeClr val="accent4">
+              <a:lumMod val="20000"/>
+              <a:lumOff val="80000"/>
+            </a:schemeClr>
+          </a:solidFill>
+          <a:ln>
+            <a:solidFill>
+              <a:schemeClr val="tx1"/>
+            </a:solidFill>
+          </a:ln>
+        </p:spPr>
+        <p:style>
+          <a:lnRef idx="2">
+            <a:schemeClr val="accent1">
+              <a:shade val="50000"/>
+            </a:schemeClr>
+          </a:lnRef>
+          <a:fillRef idx="1">
+            <a:schemeClr val="accent1"/>
+          </a:fillRef>
+          <a:effectRef idx="0">
+            <a:schemeClr val="accent1"/>
+          </a:effectRef>
+          <a:fontRef idx="minor">
+            <a:schemeClr val="lt1"/>
+          </a:fontRef>
+        </p:style>
+        <p:txBody>
+          <a:bodyPr rtlCol="0" anchor="t" anchorCtr="0"/>
+          <a:lstStyle/>
+          <a:p>
+            <a:endParaRPr lang="en-CA" dirty="0">
+              <a:solidFill>
+                <a:schemeClr val="tx1"/>
+              </a:solidFill>
+            </a:endParaRPr>
+          </a:p>
+        </p:txBody>
+      </p:sp>
+      <p:sp>
+        <p:nvSpPr>
+          <p:cNvPr id="7" name="Rectangle 6"/>
+          <p:cNvSpPr/>
+          <p:nvPr/>
+        </p:nvSpPr>
+        <p:spPr>
+          <a:xfrm>
+            <a:off x="7002657" y="921138"/>
+            <a:ext cx="827471" cy="461665"/>
+          </a:xfrm>
+          <a:prstGeom prst="rect">
+            <a:avLst/>
+          </a:prstGeom>
+        </p:spPr>
+        <p:txBody>
+          <a:bodyPr wrap="none">
+            <a:spAutoFit/>
+          </a:bodyPr>
+          <a:lstStyle/>
+          <a:p>
+            <a:r>
+              <a:rPr lang="en-US" sz="2400" b="1" dirty="0" smtClean="0">
+                <a:solidFill>
+                  <a:schemeClr val="accent1">
+                    <a:lumMod val="50000"/>
+                  </a:schemeClr>
+                </a:solidFill>
+              </a:rPr>
+              <a:t>main</a:t>
+            </a:r>
+            <a:endParaRPr lang="en-CA" sz="2400" b="1" dirty="0">
+              <a:solidFill>
+                <a:schemeClr val="accent1">
+                  <a:lumMod val="50000"/>
+                </a:schemeClr>
+              </a:solidFill>
+            </a:endParaRPr>
+          </a:p>
+        </p:txBody>
+      </p:sp>
+      <p:sp>
+        <p:nvSpPr>
+          <p:cNvPr id="8" name="Rectangle 7"/>
+          <p:cNvSpPr/>
+          <p:nvPr/>
+        </p:nvSpPr>
+        <p:spPr>
+          <a:xfrm>
+            <a:off x="942990" y="2248494"/>
+            <a:ext cx="1663148" cy="461665"/>
+          </a:xfrm>
+          <a:prstGeom prst="rect">
+            <a:avLst/>
+          </a:prstGeom>
+        </p:spPr>
+        <p:txBody>
+          <a:bodyPr wrap="none">
+            <a:spAutoFit/>
+          </a:bodyPr>
+          <a:lstStyle/>
+          <a:p>
+            <a:r>
+              <a:rPr lang="en-US" sz="2400" b="1" dirty="0" err="1" smtClean="0">
+                <a:solidFill>
+                  <a:schemeClr val="accent1">
+                    <a:lumMod val="50000"/>
+                  </a:schemeClr>
+                </a:solidFill>
+              </a:rPr>
+              <a:t>myLibraries</a:t>
+            </a:r>
+            <a:endParaRPr lang="en-CA" sz="2400" b="1" dirty="0">
+              <a:solidFill>
+                <a:schemeClr val="accent1">
+                  <a:lumMod val="50000"/>
+                </a:schemeClr>
+              </a:solidFill>
+            </a:endParaRPr>
+          </a:p>
+        </p:txBody>
+      </p:sp>
+      <p:sp>
+        <p:nvSpPr>
+          <p:cNvPr id="9" name="Rectangle 8"/>
+          <p:cNvSpPr/>
+          <p:nvPr/>
+        </p:nvSpPr>
+        <p:spPr>
+          <a:xfrm>
+            <a:off x="2092461" y="2951863"/>
+            <a:ext cx="1392804" cy="1248356"/>
+          </a:xfrm>
+          <a:prstGeom prst="rect">
+            <a:avLst/>
+          </a:prstGeom>
+          <a:solidFill>
+            <a:schemeClr val="accent2">
+              <a:lumMod val="40000"/>
+              <a:lumOff val="60000"/>
+            </a:schemeClr>
+          </a:solidFill>
+          <a:ln>
+            <a:solidFill>
+              <a:schemeClr val="tx1"/>
+            </a:solidFill>
+          </a:ln>
+        </p:spPr>
+        <p:style>
+          <a:lnRef idx="2">
+            <a:schemeClr val="accent1">
+              <a:shade val="50000"/>
+            </a:schemeClr>
+          </a:lnRef>
+          <a:fillRef idx="1">
+            <a:schemeClr val="accent1"/>
+          </a:fillRef>
+          <a:effectRef idx="0">
+            <a:schemeClr val="accent1"/>
+          </a:effectRef>
+          <a:fontRef idx="minor">
+            <a:schemeClr val="lt1"/>
+          </a:fontRef>
+        </p:style>
+        <p:txBody>
+          <a:bodyPr rtlCol="0" anchor="t" anchorCtr="0"/>
+          <a:lstStyle/>
+          <a:p>
+            <a:r>
+              <a:rPr lang="en-US" dirty="0" err="1" smtClean="0">
+                <a:solidFill>
+                  <a:schemeClr val="tx1"/>
+                </a:solidFill>
+              </a:rPr>
+              <a:t>myStdio</a:t>
+            </a:r>
+            <a:endParaRPr lang="en-US" dirty="0" smtClean="0">
+              <a:solidFill>
+                <a:schemeClr val="tx1"/>
+              </a:solidFill>
+            </a:endParaRPr>
+          </a:p>
+          <a:p>
+            <a:r>
+              <a:rPr lang="en-US" dirty="0">
+                <a:solidFill>
+                  <a:schemeClr val="tx1"/>
+                </a:solidFill>
+              </a:rPr>
+              <a:t> </a:t>
+            </a:r>
+            <a:r>
+              <a:rPr lang="en-US" dirty="0" smtClean="0">
+                <a:solidFill>
+                  <a:schemeClr val="tx1"/>
+                </a:solidFill>
+              </a:rPr>
+              <a:t>- print</a:t>
+            </a:r>
+          </a:p>
+          <a:p>
+            <a:r>
+              <a:rPr lang="en-US" dirty="0">
+                <a:solidFill>
+                  <a:schemeClr val="tx1"/>
+                </a:solidFill>
+              </a:rPr>
+              <a:t> </a:t>
+            </a:r>
+            <a:r>
+              <a:rPr lang="en-US" dirty="0" smtClean="0">
+                <a:solidFill>
+                  <a:schemeClr val="tx1"/>
+                </a:solidFill>
+              </a:rPr>
+              <a:t>- </a:t>
+            </a:r>
+            <a:r>
+              <a:rPr lang="en-US" dirty="0" err="1" smtClean="0">
+                <a:solidFill>
+                  <a:schemeClr val="tx1"/>
+                </a:solidFill>
+              </a:rPr>
+              <a:t>getchar</a:t>
+            </a:r>
+            <a:endParaRPr lang="en-US" dirty="0" smtClean="0">
+              <a:solidFill>
+                <a:schemeClr val="tx1"/>
+              </a:solidFill>
+            </a:endParaRPr>
+          </a:p>
+          <a:p>
+            <a:r>
+              <a:rPr lang="en-US" dirty="0">
+                <a:solidFill>
+                  <a:schemeClr val="tx1"/>
+                </a:solidFill>
+              </a:rPr>
+              <a:t> </a:t>
+            </a:r>
+            <a:r>
+              <a:rPr lang="en-US" dirty="0" smtClean="0">
+                <a:solidFill>
+                  <a:schemeClr val="tx1"/>
+                </a:solidFill>
+              </a:rPr>
+              <a:t>-etc.</a:t>
+            </a:r>
+            <a:endParaRPr lang="en-CA" dirty="0">
+              <a:solidFill>
+                <a:schemeClr val="tx1"/>
+              </a:solidFill>
+            </a:endParaRPr>
+          </a:p>
+        </p:txBody>
+      </p:sp>
+      <p:sp>
+        <p:nvSpPr>
+          <p:cNvPr id="10" name="Rectangle 9"/>
+          <p:cNvSpPr/>
+          <p:nvPr/>
+        </p:nvSpPr>
+        <p:spPr>
+          <a:xfrm>
+            <a:off x="6837178" y="2951863"/>
+            <a:ext cx="1606164" cy="1248356"/>
+          </a:xfrm>
+          <a:prstGeom prst="rect">
+            <a:avLst/>
+          </a:prstGeom>
+          <a:solidFill>
+            <a:schemeClr val="accent2">
+              <a:lumMod val="40000"/>
+              <a:lumOff val="60000"/>
+            </a:schemeClr>
+          </a:solidFill>
+          <a:ln>
+            <a:solidFill>
+              <a:schemeClr val="tx1"/>
+            </a:solidFill>
+          </a:ln>
+        </p:spPr>
+        <p:style>
+          <a:lnRef idx="2">
+            <a:schemeClr val="accent1">
+              <a:shade val="50000"/>
+            </a:schemeClr>
+          </a:lnRef>
+          <a:fillRef idx="1">
+            <a:schemeClr val="accent1"/>
+          </a:fillRef>
+          <a:effectRef idx="0">
+            <a:schemeClr val="accent1"/>
+          </a:effectRef>
+          <a:fontRef idx="minor">
+            <a:schemeClr val="lt1"/>
+          </a:fontRef>
+        </p:style>
+        <p:txBody>
+          <a:bodyPr rtlCol="0" anchor="t" anchorCtr="0"/>
+          <a:lstStyle/>
+          <a:p>
+            <a:r>
+              <a:rPr lang="en-US" dirty="0" err="1" smtClean="0">
+                <a:solidFill>
+                  <a:schemeClr val="tx1"/>
+                </a:solidFill>
+              </a:rPr>
+              <a:t>myTimer</a:t>
+            </a:r>
+            <a:endParaRPr lang="en-US" dirty="0" smtClean="0">
+              <a:solidFill>
+                <a:schemeClr val="tx1"/>
+              </a:solidFill>
+            </a:endParaRPr>
+          </a:p>
+          <a:p>
+            <a:r>
+              <a:rPr lang="en-US" dirty="0">
+                <a:solidFill>
+                  <a:schemeClr val="tx1"/>
+                </a:solidFill>
+              </a:rPr>
+              <a:t> </a:t>
+            </a:r>
+            <a:r>
+              <a:rPr lang="en-US" dirty="0" smtClean="0">
+                <a:solidFill>
+                  <a:schemeClr val="tx1"/>
+                </a:solidFill>
+              </a:rPr>
+              <a:t>- </a:t>
+            </a:r>
+            <a:r>
+              <a:rPr lang="en-US" dirty="0" err="1" smtClean="0">
+                <a:solidFill>
+                  <a:schemeClr val="tx1"/>
+                </a:solidFill>
+              </a:rPr>
+              <a:t>getTimerMS</a:t>
+            </a:r>
+            <a:endParaRPr lang="en-US" dirty="0" smtClean="0">
+              <a:solidFill>
+                <a:schemeClr val="tx1"/>
+              </a:solidFill>
+            </a:endParaRPr>
+          </a:p>
+          <a:p>
+            <a:r>
+              <a:rPr lang="en-US" dirty="0">
+                <a:solidFill>
+                  <a:schemeClr val="tx1"/>
+                </a:solidFill>
+              </a:rPr>
+              <a:t> </a:t>
+            </a:r>
+            <a:r>
+              <a:rPr lang="en-US" dirty="0" smtClean="0">
+                <a:solidFill>
+                  <a:schemeClr val="tx1"/>
+                </a:solidFill>
+              </a:rPr>
+              <a:t>- etc.</a:t>
+            </a:r>
+            <a:endParaRPr lang="en-CA" dirty="0">
+              <a:solidFill>
+                <a:schemeClr val="tx1"/>
+              </a:solidFill>
+            </a:endParaRPr>
+          </a:p>
+        </p:txBody>
+      </p:sp>
+      <p:sp>
+        <p:nvSpPr>
+          <p:cNvPr id="11" name="Rectangle 10"/>
+          <p:cNvSpPr/>
+          <p:nvPr/>
+        </p:nvSpPr>
+        <p:spPr>
+          <a:xfrm>
+            <a:off x="4230479" y="2943910"/>
+            <a:ext cx="1886670" cy="1256309"/>
+          </a:xfrm>
+          <a:prstGeom prst="rect">
+            <a:avLst/>
+          </a:prstGeom>
+          <a:solidFill>
+            <a:schemeClr val="accent2">
+              <a:lumMod val="40000"/>
+              <a:lumOff val="60000"/>
+            </a:schemeClr>
+          </a:solidFill>
+          <a:ln>
+            <a:solidFill>
+              <a:schemeClr val="tx1"/>
+            </a:solidFill>
+          </a:ln>
+        </p:spPr>
+        <p:style>
+          <a:lnRef idx="2">
+            <a:schemeClr val="accent1">
+              <a:shade val="50000"/>
+            </a:schemeClr>
+          </a:lnRef>
+          <a:fillRef idx="1">
+            <a:schemeClr val="accent1"/>
+          </a:fillRef>
+          <a:effectRef idx="0">
+            <a:schemeClr val="accent1"/>
+          </a:effectRef>
+          <a:fontRef idx="minor">
+            <a:schemeClr val="lt1"/>
+          </a:fontRef>
+        </p:style>
+        <p:txBody>
+          <a:bodyPr rtlCol="0" anchor="t" anchorCtr="0"/>
+          <a:lstStyle/>
+          <a:p>
+            <a:r>
+              <a:rPr lang="en-US" dirty="0" err="1" smtClean="0">
+                <a:solidFill>
+                  <a:schemeClr val="tx1"/>
+                </a:solidFill>
+              </a:rPr>
+              <a:t>myVideo</a:t>
+            </a:r>
+            <a:endParaRPr lang="en-US" dirty="0" smtClean="0">
+              <a:solidFill>
+                <a:schemeClr val="tx1"/>
+              </a:solidFill>
+            </a:endParaRPr>
+          </a:p>
+          <a:p>
+            <a:r>
+              <a:rPr lang="en-US" dirty="0">
+                <a:solidFill>
+                  <a:schemeClr val="tx1"/>
+                </a:solidFill>
+              </a:rPr>
+              <a:t> </a:t>
+            </a:r>
+            <a:r>
+              <a:rPr lang="en-US" dirty="0" smtClean="0">
+                <a:solidFill>
+                  <a:schemeClr val="tx1"/>
+                </a:solidFill>
+              </a:rPr>
+              <a:t>- </a:t>
+            </a:r>
+            <a:r>
+              <a:rPr lang="en-US" dirty="0" err="1" smtClean="0">
+                <a:solidFill>
+                  <a:schemeClr val="tx1"/>
+                </a:solidFill>
+              </a:rPr>
+              <a:t>drawPixel</a:t>
+            </a:r>
+            <a:endParaRPr lang="en-US" dirty="0" smtClean="0">
+              <a:solidFill>
+                <a:schemeClr val="tx1"/>
+              </a:solidFill>
+            </a:endParaRPr>
+          </a:p>
+          <a:p>
+            <a:r>
+              <a:rPr lang="en-US" dirty="0">
+                <a:solidFill>
+                  <a:schemeClr val="tx1"/>
+                </a:solidFill>
+              </a:rPr>
+              <a:t> </a:t>
+            </a:r>
+            <a:r>
+              <a:rPr lang="en-US" dirty="0" smtClean="0">
+                <a:solidFill>
+                  <a:schemeClr val="tx1"/>
+                </a:solidFill>
+              </a:rPr>
+              <a:t>- </a:t>
+            </a:r>
+            <a:r>
+              <a:rPr lang="en-US" dirty="0" err="1" smtClean="0">
+                <a:solidFill>
+                  <a:schemeClr val="tx1"/>
+                </a:solidFill>
+              </a:rPr>
+              <a:t>drawLineBuffer</a:t>
+            </a:r>
+            <a:endParaRPr lang="en-US" dirty="0" smtClean="0">
+              <a:solidFill>
+                <a:schemeClr val="tx1"/>
+              </a:solidFill>
+            </a:endParaRPr>
+          </a:p>
+          <a:p>
+            <a:r>
+              <a:rPr lang="en-US" dirty="0">
+                <a:solidFill>
+                  <a:schemeClr val="tx1"/>
+                </a:solidFill>
+              </a:rPr>
+              <a:t> </a:t>
+            </a:r>
+            <a:r>
+              <a:rPr lang="en-US" dirty="0" smtClean="0">
+                <a:solidFill>
+                  <a:schemeClr val="tx1"/>
+                </a:solidFill>
+              </a:rPr>
+              <a:t>- etc.</a:t>
+            </a:r>
+            <a:endParaRPr lang="en-CA" dirty="0">
+              <a:solidFill>
+                <a:schemeClr val="tx1"/>
+              </a:solidFill>
+            </a:endParaRPr>
+          </a:p>
+        </p:txBody>
+      </p:sp>
+      <p:sp>
+        <p:nvSpPr>
+          <p:cNvPr id="12" name="Rectangle 11"/>
+          <p:cNvSpPr/>
+          <p:nvPr/>
+        </p:nvSpPr>
+        <p:spPr>
+          <a:xfrm>
+            <a:off x="966974" y="5576597"/>
+            <a:ext cx="1171715" cy="392550"/>
+          </a:xfrm>
+          <a:prstGeom prst="rect">
+            <a:avLst/>
+          </a:prstGeom>
+          <a:solidFill>
+            <a:schemeClr val="accent2">
+              <a:lumMod val="40000"/>
+              <a:lumOff val="60000"/>
+            </a:schemeClr>
+          </a:solidFill>
+          <a:ln>
+            <a:solidFill>
+              <a:schemeClr val="tx1"/>
+            </a:solidFill>
+          </a:ln>
+        </p:spPr>
+        <p:style>
+          <a:lnRef idx="2">
+            <a:schemeClr val="accent1">
+              <a:shade val="50000"/>
+            </a:schemeClr>
+          </a:lnRef>
+          <a:fillRef idx="1">
+            <a:schemeClr val="accent1"/>
+          </a:fillRef>
+          <a:effectRef idx="0">
+            <a:schemeClr val="accent1"/>
+          </a:effectRef>
+          <a:fontRef idx="minor">
+            <a:schemeClr val="lt1"/>
+          </a:fontRef>
+        </p:style>
+        <p:txBody>
+          <a:bodyPr rtlCol="0" anchor="t" anchorCtr="0"/>
+          <a:lstStyle/>
+          <a:p>
+            <a:r>
+              <a:rPr lang="en-US" dirty="0" err="1" smtClean="0">
+                <a:solidFill>
+                  <a:schemeClr val="tx1"/>
+                </a:solidFill>
+              </a:rPr>
+              <a:t>charLcd</a:t>
+            </a:r>
+            <a:endParaRPr lang="en-CA" dirty="0">
+              <a:solidFill>
+                <a:schemeClr val="tx1"/>
+              </a:solidFill>
+            </a:endParaRPr>
+          </a:p>
+        </p:txBody>
+      </p:sp>
+      <p:sp>
+        <p:nvSpPr>
+          <p:cNvPr id="13" name="Rectangle 12"/>
+          <p:cNvSpPr/>
+          <p:nvPr/>
+        </p:nvSpPr>
+        <p:spPr>
+          <a:xfrm>
+            <a:off x="3733530" y="5568646"/>
+            <a:ext cx="1736755" cy="392550"/>
+          </a:xfrm>
+          <a:prstGeom prst="rect">
+            <a:avLst/>
+          </a:prstGeom>
+          <a:solidFill>
+            <a:schemeClr val="accent2">
+              <a:lumMod val="40000"/>
+              <a:lumOff val="60000"/>
+            </a:schemeClr>
+          </a:solidFill>
+          <a:ln>
+            <a:solidFill>
+              <a:schemeClr val="tx1"/>
+            </a:solidFill>
+          </a:ln>
+        </p:spPr>
+        <p:style>
+          <a:lnRef idx="2">
+            <a:schemeClr val="accent1">
+              <a:shade val="50000"/>
+            </a:schemeClr>
+          </a:lnRef>
+          <a:fillRef idx="1">
+            <a:schemeClr val="accent1"/>
+          </a:fillRef>
+          <a:effectRef idx="0">
+            <a:schemeClr val="accent1"/>
+          </a:effectRef>
+          <a:fontRef idx="minor">
+            <a:schemeClr val="lt1"/>
+          </a:fontRef>
+        </p:style>
+        <p:txBody>
+          <a:bodyPr rtlCol="0" anchor="t" anchorCtr="0"/>
+          <a:lstStyle/>
+          <a:p>
+            <a:r>
+              <a:rPr lang="en-US" dirty="0" smtClean="0">
+                <a:solidFill>
+                  <a:schemeClr val="tx1"/>
+                </a:solidFill>
+              </a:rPr>
+              <a:t>lcdST7735R_SPI</a:t>
+            </a:r>
+            <a:endParaRPr lang="en-CA" dirty="0">
+              <a:solidFill>
+                <a:schemeClr val="tx1"/>
+              </a:solidFill>
+            </a:endParaRPr>
+          </a:p>
+        </p:txBody>
+      </p:sp>
+      <p:sp>
+        <p:nvSpPr>
+          <p:cNvPr id="15" name="Rectangle 14"/>
+          <p:cNvSpPr/>
+          <p:nvPr/>
+        </p:nvSpPr>
+        <p:spPr>
+          <a:xfrm>
+            <a:off x="7066758" y="5568646"/>
+            <a:ext cx="1708044" cy="392550"/>
+          </a:xfrm>
+          <a:prstGeom prst="rect">
+            <a:avLst/>
+          </a:prstGeom>
+          <a:solidFill>
+            <a:schemeClr val="accent2">
+              <a:lumMod val="40000"/>
+              <a:lumOff val="60000"/>
+            </a:schemeClr>
+          </a:solidFill>
+          <a:ln>
+            <a:solidFill>
+              <a:schemeClr val="tx1"/>
+            </a:solidFill>
+          </a:ln>
+        </p:spPr>
+        <p:style>
+          <a:lnRef idx="2">
+            <a:schemeClr val="accent1">
+              <a:shade val="50000"/>
+            </a:schemeClr>
+          </a:lnRef>
+          <a:fillRef idx="1">
+            <a:schemeClr val="accent1"/>
+          </a:fillRef>
+          <a:effectRef idx="0">
+            <a:schemeClr val="accent1"/>
+          </a:effectRef>
+          <a:fontRef idx="minor">
+            <a:schemeClr val="lt1"/>
+          </a:fontRef>
+        </p:style>
+        <p:txBody>
+          <a:bodyPr rtlCol="0" anchor="t" anchorCtr="0"/>
+          <a:lstStyle/>
+          <a:p>
+            <a:r>
+              <a:rPr lang="en-US" dirty="0" smtClean="0">
+                <a:solidFill>
+                  <a:schemeClr val="tx1"/>
+                </a:solidFill>
+              </a:rPr>
+              <a:t>timer0System</a:t>
+            </a:r>
+            <a:endParaRPr lang="en-CA" dirty="0">
+              <a:solidFill>
+                <a:schemeClr val="tx1"/>
+              </a:solidFill>
+            </a:endParaRPr>
+          </a:p>
+        </p:txBody>
+      </p:sp>
+      <p:sp>
+        <p:nvSpPr>
+          <p:cNvPr id="16" name="Rectangle 15"/>
+          <p:cNvSpPr/>
+          <p:nvPr/>
+        </p:nvSpPr>
+        <p:spPr>
+          <a:xfrm>
+            <a:off x="2515572" y="5584548"/>
+            <a:ext cx="795666" cy="392550"/>
+          </a:xfrm>
+          <a:prstGeom prst="rect">
+            <a:avLst/>
+          </a:prstGeom>
+          <a:solidFill>
+            <a:schemeClr val="accent2">
+              <a:lumMod val="40000"/>
+              <a:lumOff val="60000"/>
+            </a:schemeClr>
+          </a:solidFill>
+          <a:ln>
+            <a:solidFill>
+              <a:schemeClr val="tx1"/>
+            </a:solidFill>
+          </a:ln>
+        </p:spPr>
+        <p:style>
+          <a:lnRef idx="2">
+            <a:schemeClr val="accent1">
+              <a:shade val="50000"/>
+            </a:schemeClr>
+          </a:lnRef>
+          <a:fillRef idx="1">
+            <a:schemeClr val="accent1"/>
+          </a:fillRef>
+          <a:effectRef idx="0">
+            <a:schemeClr val="accent1"/>
+          </a:effectRef>
+          <a:fontRef idx="minor">
+            <a:schemeClr val="lt1"/>
+          </a:fontRef>
+        </p:style>
+        <p:txBody>
+          <a:bodyPr rtlCol="0" anchor="t" anchorCtr="0"/>
+          <a:lstStyle/>
+          <a:p>
+            <a:r>
+              <a:rPr lang="en-US" dirty="0" smtClean="0">
+                <a:solidFill>
+                  <a:schemeClr val="tx1"/>
+                </a:solidFill>
+              </a:rPr>
+              <a:t>uart0</a:t>
+            </a:r>
+            <a:endParaRPr lang="en-CA" dirty="0">
+              <a:solidFill>
+                <a:schemeClr val="tx1"/>
+              </a:solidFill>
+            </a:endParaRPr>
+          </a:p>
+        </p:txBody>
+      </p:sp>
+      <p:sp>
+        <p:nvSpPr>
+          <p:cNvPr id="17" name="Rectangle 16"/>
+          <p:cNvSpPr/>
+          <p:nvPr/>
+        </p:nvSpPr>
+        <p:spPr>
+          <a:xfrm>
+            <a:off x="8248132" y="6335666"/>
+            <a:ext cx="878912" cy="392550"/>
+          </a:xfrm>
+          <a:prstGeom prst="rect">
+            <a:avLst/>
+          </a:prstGeom>
+          <a:solidFill>
+            <a:schemeClr val="accent2">
+              <a:lumMod val="40000"/>
+              <a:lumOff val="60000"/>
+            </a:schemeClr>
+          </a:solidFill>
+          <a:ln>
+            <a:solidFill>
+              <a:schemeClr val="tx1"/>
+            </a:solidFill>
+          </a:ln>
+        </p:spPr>
+        <p:style>
+          <a:lnRef idx="2">
+            <a:schemeClr val="accent1">
+              <a:shade val="50000"/>
+            </a:schemeClr>
+          </a:lnRef>
+          <a:fillRef idx="1">
+            <a:schemeClr val="accent1"/>
+          </a:fillRef>
+          <a:effectRef idx="0">
+            <a:schemeClr val="accent1"/>
+          </a:effectRef>
+          <a:fontRef idx="minor">
+            <a:schemeClr val="lt1"/>
+          </a:fontRef>
+        </p:style>
+        <p:txBody>
+          <a:bodyPr rtlCol="0" anchor="t" anchorCtr="0"/>
+          <a:lstStyle/>
+          <a:p>
+            <a:r>
+              <a:rPr lang="en-US" dirty="0" err="1" smtClean="0">
+                <a:solidFill>
+                  <a:schemeClr val="tx1"/>
+                </a:solidFill>
+              </a:rPr>
+              <a:t>spi</a:t>
+            </a:r>
+            <a:endParaRPr lang="en-CA" dirty="0">
+              <a:solidFill>
+                <a:schemeClr val="tx1"/>
+              </a:solidFill>
+            </a:endParaRPr>
+          </a:p>
+        </p:txBody>
+      </p:sp>
+      <p:sp>
+        <p:nvSpPr>
+          <p:cNvPr id="18" name="Rectangle 17"/>
+          <p:cNvSpPr/>
+          <p:nvPr/>
+        </p:nvSpPr>
+        <p:spPr>
+          <a:xfrm>
+            <a:off x="9478891" y="2951863"/>
+            <a:ext cx="1377565" cy="392550"/>
+          </a:xfrm>
+          <a:prstGeom prst="rect">
+            <a:avLst/>
+          </a:prstGeom>
+          <a:solidFill>
+            <a:schemeClr val="accent2">
+              <a:lumMod val="40000"/>
+              <a:lumOff val="60000"/>
+            </a:schemeClr>
+          </a:solidFill>
+          <a:ln>
+            <a:solidFill>
+              <a:schemeClr val="tx1"/>
+            </a:solidFill>
+          </a:ln>
+        </p:spPr>
+        <p:style>
+          <a:lnRef idx="2">
+            <a:schemeClr val="accent1">
+              <a:shade val="50000"/>
+            </a:schemeClr>
+          </a:lnRef>
+          <a:fillRef idx="1">
+            <a:schemeClr val="accent1"/>
+          </a:fillRef>
+          <a:effectRef idx="0">
+            <a:schemeClr val="accent1"/>
+          </a:effectRef>
+          <a:fontRef idx="minor">
+            <a:schemeClr val="lt1"/>
+          </a:fontRef>
+        </p:style>
+        <p:txBody>
+          <a:bodyPr rtlCol="0" anchor="t" anchorCtr="0"/>
+          <a:lstStyle/>
+          <a:p>
+            <a:r>
+              <a:rPr lang="en-US" dirty="0" err="1" smtClean="0">
+                <a:solidFill>
+                  <a:schemeClr val="tx1"/>
+                </a:solidFill>
+              </a:rPr>
+              <a:t>petitFatFS</a:t>
+            </a:r>
+            <a:endParaRPr lang="en-CA" dirty="0">
+              <a:solidFill>
+                <a:schemeClr val="tx1"/>
+              </a:solidFill>
+            </a:endParaRPr>
+          </a:p>
+        </p:txBody>
+      </p:sp>
+      <p:sp>
+        <p:nvSpPr>
+          <p:cNvPr id="19" name="Rectangle 18"/>
+          <p:cNvSpPr/>
+          <p:nvPr/>
+        </p:nvSpPr>
+        <p:spPr>
+          <a:xfrm>
+            <a:off x="4944185" y="1713068"/>
+            <a:ext cx="729753" cy="349857"/>
+          </a:xfrm>
+          <a:prstGeom prst="rect">
+            <a:avLst/>
+          </a:prstGeom>
+          <a:solidFill>
+            <a:schemeClr val="accent4">
+              <a:lumMod val="20000"/>
+              <a:lumOff val="80000"/>
+            </a:schemeClr>
+          </a:solidFill>
+          <a:ln>
+            <a:solidFill>
+              <a:schemeClr val="tx1"/>
+            </a:solidFill>
+          </a:ln>
+        </p:spPr>
+        <p:style>
+          <a:lnRef idx="2">
+            <a:schemeClr val="accent1">
+              <a:shade val="50000"/>
+            </a:schemeClr>
+          </a:lnRef>
+          <a:fillRef idx="1">
+            <a:schemeClr val="accent1"/>
+          </a:fillRef>
+          <a:effectRef idx="0">
+            <a:schemeClr val="accent1"/>
+          </a:effectRef>
+          <a:fontRef idx="minor">
+            <a:schemeClr val="lt1"/>
+          </a:fontRef>
+        </p:style>
+        <p:txBody>
+          <a:bodyPr rtlCol="0" anchor="t" anchorCtr="0"/>
+          <a:lstStyle/>
+          <a:p>
+            <a:endParaRPr lang="en-CA" dirty="0">
+              <a:solidFill>
+                <a:schemeClr val="tx1"/>
+              </a:solidFill>
+            </a:endParaRPr>
+          </a:p>
+        </p:txBody>
+      </p:sp>
+      <p:sp>
+        <p:nvSpPr>
+          <p:cNvPr id="20" name="Rectangle 19"/>
+          <p:cNvSpPr/>
+          <p:nvPr/>
+        </p:nvSpPr>
+        <p:spPr>
+          <a:xfrm>
+            <a:off x="5716701" y="1764728"/>
+            <a:ext cx="1606658" cy="461665"/>
+          </a:xfrm>
+          <a:prstGeom prst="rect">
+            <a:avLst/>
+          </a:prstGeom>
+        </p:spPr>
+        <p:txBody>
+          <a:bodyPr wrap="none">
+            <a:spAutoFit/>
+          </a:bodyPr>
+          <a:lstStyle/>
+          <a:p>
+            <a:r>
+              <a:rPr lang="en-US" sz="2400" b="1" dirty="0" smtClean="0">
+                <a:solidFill>
+                  <a:schemeClr val="accent1">
+                    <a:lumMod val="50000"/>
+                  </a:schemeClr>
+                </a:solidFill>
+              </a:rPr>
+              <a:t>application</a:t>
+            </a:r>
+            <a:endParaRPr lang="en-CA" sz="2400" b="1" dirty="0">
+              <a:solidFill>
+                <a:schemeClr val="accent1">
+                  <a:lumMod val="50000"/>
+                </a:schemeClr>
+              </a:solidFill>
+            </a:endParaRPr>
+          </a:p>
+        </p:txBody>
+      </p:sp>
+      <p:cxnSp>
+        <p:nvCxnSpPr>
+          <p:cNvPr id="23" name="Straight Arrow Connector 22"/>
+          <p:cNvCxnSpPr>
+            <a:stCxn id="9" idx="2"/>
+            <a:endCxn id="12" idx="0"/>
+          </p:cNvCxnSpPr>
+          <p:nvPr/>
+        </p:nvCxnSpPr>
+        <p:spPr>
+          <a:xfrm flipH="1">
+            <a:off x="1552832" y="4200219"/>
+            <a:ext cx="1236031" cy="1376378"/>
+          </a:xfrm>
+          <a:prstGeom prst="straightConnector1">
+            <a:avLst/>
+          </a:prstGeom>
+          <a:ln>
+            <a:tailEnd type="triangle"/>
+          </a:ln>
+        </p:spPr>
+        <p:style>
+          <a:lnRef idx="1">
+            <a:schemeClr val="accent1"/>
+          </a:lnRef>
+          <a:fillRef idx="0">
+            <a:schemeClr val="accent1"/>
+          </a:fillRef>
+          <a:effectRef idx="0">
+            <a:schemeClr val="accent1"/>
+          </a:effectRef>
+          <a:fontRef idx="minor">
+            <a:schemeClr val="tx1"/>
+          </a:fontRef>
+        </p:style>
+      </p:cxnSp>
+      <p:cxnSp>
+        <p:nvCxnSpPr>
+          <p:cNvPr id="24" name="Straight Arrow Connector 23"/>
+          <p:cNvCxnSpPr>
+            <a:stCxn id="9" idx="2"/>
+            <a:endCxn id="13" idx="0"/>
+          </p:cNvCxnSpPr>
+          <p:nvPr/>
+        </p:nvCxnSpPr>
+        <p:spPr>
+          <a:xfrm>
+            <a:off x="2788863" y="4200219"/>
+            <a:ext cx="1813045" cy="1368427"/>
+          </a:xfrm>
+          <a:prstGeom prst="straightConnector1">
+            <a:avLst/>
+          </a:prstGeom>
+          <a:ln>
+            <a:tailEnd type="triangle"/>
+          </a:ln>
+        </p:spPr>
+        <p:style>
+          <a:lnRef idx="1">
+            <a:schemeClr val="accent1"/>
+          </a:lnRef>
+          <a:fillRef idx="0">
+            <a:schemeClr val="accent1"/>
+          </a:fillRef>
+          <a:effectRef idx="0">
+            <a:schemeClr val="accent1"/>
+          </a:effectRef>
+          <a:fontRef idx="minor">
+            <a:schemeClr val="tx1"/>
+          </a:fontRef>
+        </p:style>
+      </p:cxnSp>
+      <p:cxnSp>
+        <p:nvCxnSpPr>
+          <p:cNvPr id="27" name="Straight Arrow Connector 26"/>
+          <p:cNvCxnSpPr>
+            <a:stCxn id="11" idx="2"/>
+            <a:endCxn id="13" idx="0"/>
+          </p:cNvCxnSpPr>
+          <p:nvPr/>
+        </p:nvCxnSpPr>
+        <p:spPr>
+          <a:xfrm flipH="1">
+            <a:off x="4601908" y="4200219"/>
+            <a:ext cx="571906" cy="1368427"/>
+          </a:xfrm>
+          <a:prstGeom prst="straightConnector1">
+            <a:avLst/>
+          </a:prstGeom>
+          <a:ln>
+            <a:tailEnd type="triangle"/>
+          </a:ln>
+        </p:spPr>
+        <p:style>
+          <a:lnRef idx="1">
+            <a:schemeClr val="accent1"/>
+          </a:lnRef>
+          <a:fillRef idx="0">
+            <a:schemeClr val="accent1"/>
+          </a:fillRef>
+          <a:effectRef idx="0">
+            <a:schemeClr val="accent1"/>
+          </a:effectRef>
+          <a:fontRef idx="minor">
+            <a:schemeClr val="tx1"/>
+          </a:fontRef>
+        </p:style>
+      </p:cxnSp>
+      <p:cxnSp>
+        <p:nvCxnSpPr>
+          <p:cNvPr id="30" name="Straight Arrow Connector 29"/>
+          <p:cNvCxnSpPr>
+            <a:stCxn id="9" idx="2"/>
+            <a:endCxn id="16" idx="0"/>
+          </p:cNvCxnSpPr>
+          <p:nvPr/>
+        </p:nvCxnSpPr>
+        <p:spPr>
+          <a:xfrm>
+            <a:off x="2788863" y="4200219"/>
+            <a:ext cx="124542" cy="1384329"/>
+          </a:xfrm>
+          <a:prstGeom prst="straightConnector1">
+            <a:avLst/>
+          </a:prstGeom>
+          <a:ln>
+            <a:tailEnd type="triangle"/>
+          </a:ln>
+        </p:spPr>
+        <p:style>
+          <a:lnRef idx="1">
+            <a:schemeClr val="accent1"/>
+          </a:lnRef>
+          <a:fillRef idx="0">
+            <a:schemeClr val="accent1"/>
+          </a:fillRef>
+          <a:effectRef idx="0">
+            <a:schemeClr val="accent1"/>
+          </a:effectRef>
+          <a:fontRef idx="minor">
+            <a:schemeClr val="tx1"/>
+          </a:fontRef>
+        </p:style>
+      </p:cxnSp>
+      <p:cxnSp>
+        <p:nvCxnSpPr>
+          <p:cNvPr id="39" name="Straight Arrow Connector 38"/>
+          <p:cNvCxnSpPr>
+            <a:stCxn id="10" idx="2"/>
+            <a:endCxn id="15" idx="0"/>
+          </p:cNvCxnSpPr>
+          <p:nvPr/>
+        </p:nvCxnSpPr>
+        <p:spPr>
+          <a:xfrm>
+            <a:off x="7640260" y="4200219"/>
+            <a:ext cx="280520" cy="1368427"/>
+          </a:xfrm>
+          <a:prstGeom prst="straightConnector1">
+            <a:avLst/>
+          </a:prstGeom>
+          <a:ln>
+            <a:tailEnd type="triangle"/>
+          </a:ln>
+        </p:spPr>
+        <p:style>
+          <a:lnRef idx="1">
+            <a:schemeClr val="accent1"/>
+          </a:lnRef>
+          <a:fillRef idx="0">
+            <a:schemeClr val="accent1"/>
+          </a:fillRef>
+          <a:effectRef idx="0">
+            <a:schemeClr val="accent1"/>
+          </a:effectRef>
+          <a:fontRef idx="minor">
+            <a:schemeClr val="tx1"/>
+          </a:fontRef>
+        </p:style>
+      </p:cxnSp>
+      <p:cxnSp>
+        <p:nvCxnSpPr>
+          <p:cNvPr id="43" name="Straight Arrow Connector 42"/>
+          <p:cNvCxnSpPr>
+            <a:stCxn id="13" idx="2"/>
+            <a:endCxn id="17" idx="0"/>
+          </p:cNvCxnSpPr>
+          <p:nvPr/>
+        </p:nvCxnSpPr>
+        <p:spPr>
+          <a:xfrm>
+            <a:off x="4601908" y="5961196"/>
+            <a:ext cx="4085680" cy="374470"/>
+          </a:xfrm>
+          <a:prstGeom prst="straightConnector1">
+            <a:avLst/>
+          </a:prstGeom>
+          <a:ln>
+            <a:tailEnd type="triangle"/>
+          </a:ln>
+        </p:spPr>
+        <p:style>
+          <a:lnRef idx="1">
+            <a:schemeClr val="accent1"/>
+          </a:lnRef>
+          <a:fillRef idx="0">
+            <a:schemeClr val="accent1"/>
+          </a:fillRef>
+          <a:effectRef idx="0">
+            <a:schemeClr val="accent1"/>
+          </a:effectRef>
+          <a:fontRef idx="minor">
+            <a:schemeClr val="tx1"/>
+          </a:fontRef>
+        </p:style>
+      </p:cxnSp>
+      <p:cxnSp>
+        <p:nvCxnSpPr>
+          <p:cNvPr id="46" name="Straight Arrow Connector 45"/>
+          <p:cNvCxnSpPr>
+            <a:stCxn id="18" idx="2"/>
+            <a:endCxn id="17" idx="0"/>
+          </p:cNvCxnSpPr>
+          <p:nvPr/>
+        </p:nvCxnSpPr>
+        <p:spPr>
+          <a:xfrm flipH="1">
+            <a:off x="8687588" y="3344413"/>
+            <a:ext cx="1480086" cy="2991253"/>
+          </a:xfrm>
+          <a:prstGeom prst="straightConnector1">
+            <a:avLst/>
+          </a:prstGeom>
+          <a:ln>
+            <a:tailEnd type="triangle"/>
+          </a:ln>
+        </p:spPr>
+        <p:style>
+          <a:lnRef idx="1">
+            <a:schemeClr val="accent1"/>
+          </a:lnRef>
+          <a:fillRef idx="0">
+            <a:schemeClr val="accent1"/>
+          </a:fillRef>
+          <a:effectRef idx="0">
+            <a:schemeClr val="accent1"/>
+          </a:effectRef>
+          <a:fontRef idx="minor">
+            <a:schemeClr val="tx1"/>
+          </a:fontRef>
+        </p:style>
+      </p:cxnSp>
+      <p:sp>
+        <p:nvSpPr>
+          <p:cNvPr id="54" name="Rectangular Callout 53"/>
+          <p:cNvSpPr/>
+          <p:nvPr/>
+        </p:nvSpPr>
+        <p:spPr>
+          <a:xfrm>
+            <a:off x="8380300" y="661353"/>
+            <a:ext cx="1561888" cy="668141"/>
+          </a:xfrm>
+          <a:prstGeom prst="wedgeRectCallout">
+            <a:avLst>
+              <a:gd name="adj1" fmla="val -78093"/>
+              <a:gd name="adj2" fmla="val 24034"/>
+            </a:avLst>
+          </a:prstGeom>
+          <a:solidFill>
+            <a:schemeClr val="accent6">
+              <a:lumMod val="20000"/>
+              <a:lumOff val="80000"/>
+            </a:schemeClr>
+          </a:solidFill>
+          <a:ln>
+            <a:solidFill>
+              <a:schemeClr val="tx1"/>
+            </a:solidFill>
+          </a:ln>
+        </p:spPr>
+        <p:style>
+          <a:lnRef idx="2">
+            <a:schemeClr val="accent1">
+              <a:shade val="50000"/>
+            </a:schemeClr>
+          </a:lnRef>
+          <a:fillRef idx="1">
+            <a:schemeClr val="accent1"/>
+          </a:fillRef>
+          <a:effectRef idx="0">
+            <a:schemeClr val="accent1"/>
+          </a:effectRef>
+          <a:fontRef idx="minor">
+            <a:schemeClr val="lt1"/>
+          </a:fontRef>
+        </p:style>
+        <p:txBody>
+          <a:bodyPr rtlCol="0" anchor="t" anchorCtr="0"/>
+          <a:lstStyle/>
+          <a:p>
+            <a:r>
+              <a:rPr lang="en-US" sz="1600" dirty="0" smtClean="0">
+                <a:solidFill>
+                  <a:schemeClr val="tx1"/>
+                </a:solidFill>
+              </a:rPr>
+              <a:t>Call application to run</a:t>
+            </a:r>
+            <a:endParaRPr lang="en-CA" sz="1600" dirty="0">
+              <a:solidFill>
+                <a:schemeClr val="tx1"/>
+              </a:solidFill>
+            </a:endParaRPr>
+          </a:p>
+        </p:txBody>
+      </p:sp>
+      <p:sp>
+        <p:nvSpPr>
+          <p:cNvPr id="55" name="Rectangular Callout 54"/>
+          <p:cNvSpPr/>
+          <p:nvPr/>
+        </p:nvSpPr>
+        <p:spPr>
+          <a:xfrm>
+            <a:off x="942990" y="6287851"/>
+            <a:ext cx="2090661" cy="574993"/>
+          </a:xfrm>
+          <a:prstGeom prst="wedgeRectCallout">
+            <a:avLst>
+              <a:gd name="adj1" fmla="val 30782"/>
+              <a:gd name="adj2" fmla="val -61075"/>
+            </a:avLst>
+          </a:prstGeom>
+          <a:solidFill>
+            <a:schemeClr val="accent6">
+              <a:lumMod val="20000"/>
+              <a:lumOff val="80000"/>
+            </a:schemeClr>
+          </a:solidFill>
+          <a:ln>
+            <a:solidFill>
+              <a:schemeClr val="tx1"/>
+            </a:solidFill>
+          </a:ln>
+        </p:spPr>
+        <p:style>
+          <a:lnRef idx="2">
+            <a:schemeClr val="accent1">
+              <a:shade val="50000"/>
+            </a:schemeClr>
+          </a:lnRef>
+          <a:fillRef idx="1">
+            <a:schemeClr val="accent1"/>
+          </a:fillRef>
+          <a:effectRef idx="0">
+            <a:schemeClr val="accent1"/>
+          </a:effectRef>
+          <a:fontRef idx="minor">
+            <a:schemeClr val="lt1"/>
+          </a:fontRef>
+        </p:style>
+        <p:txBody>
+          <a:bodyPr rtlCol="0" anchor="t" anchorCtr="0"/>
+          <a:lstStyle/>
+          <a:p>
+            <a:r>
+              <a:rPr lang="en-US" sz="1400" dirty="0" smtClean="0">
+                <a:solidFill>
+                  <a:schemeClr val="tx1"/>
+                </a:solidFill>
+              </a:rPr>
+              <a:t>Each resource module has </a:t>
+            </a:r>
+            <a:r>
+              <a:rPr lang="en-US" sz="1400" dirty="0" err="1" smtClean="0">
+                <a:solidFill>
+                  <a:schemeClr val="tx1"/>
+                </a:solidFill>
+              </a:rPr>
+              <a:t>XXXconfig.h</a:t>
+            </a:r>
+            <a:r>
+              <a:rPr lang="en-US" sz="1400" dirty="0" smtClean="0">
+                <a:solidFill>
+                  <a:schemeClr val="tx1"/>
+                </a:solidFill>
+              </a:rPr>
+              <a:t> for porting</a:t>
+            </a:r>
+            <a:endParaRPr lang="en-CA" sz="1400" dirty="0">
+              <a:solidFill>
+                <a:schemeClr val="tx1"/>
+              </a:solidFill>
+            </a:endParaRPr>
+          </a:p>
+        </p:txBody>
+      </p:sp>
+      <p:cxnSp>
+        <p:nvCxnSpPr>
+          <p:cNvPr id="56" name="Straight Arrow Connector 55"/>
+          <p:cNvCxnSpPr>
+            <a:stCxn id="5" idx="2"/>
+            <a:endCxn id="19" idx="0"/>
+          </p:cNvCxnSpPr>
+          <p:nvPr/>
+        </p:nvCxnSpPr>
+        <p:spPr>
+          <a:xfrm flipH="1">
+            <a:off x="5309062" y="1398899"/>
+            <a:ext cx="1292364" cy="314169"/>
+          </a:xfrm>
+          <a:prstGeom prst="straightConnector1">
+            <a:avLst/>
+          </a:prstGeom>
+          <a:ln>
+            <a:tailEnd type="triangle"/>
+          </a:ln>
+        </p:spPr>
+        <p:style>
+          <a:lnRef idx="1">
+            <a:schemeClr val="accent1"/>
+          </a:lnRef>
+          <a:fillRef idx="0">
+            <a:schemeClr val="accent1"/>
+          </a:fillRef>
+          <a:effectRef idx="0">
+            <a:schemeClr val="accent1"/>
+          </a:effectRef>
+          <a:fontRef idx="minor">
+            <a:schemeClr val="tx1"/>
+          </a:fontRef>
+        </p:style>
+      </p:cxnSp>
+      <p:cxnSp>
+        <p:nvCxnSpPr>
+          <p:cNvPr id="59" name="Straight Arrow Connector 58"/>
+          <p:cNvCxnSpPr>
+            <a:stCxn id="19" idx="2"/>
+            <a:endCxn id="6" idx="0"/>
+          </p:cNvCxnSpPr>
+          <p:nvPr/>
+        </p:nvCxnSpPr>
+        <p:spPr>
+          <a:xfrm flipH="1">
+            <a:off x="5303904" y="2062925"/>
+            <a:ext cx="5158" cy="624281"/>
+          </a:xfrm>
+          <a:prstGeom prst="straightConnector1">
+            <a:avLst/>
+          </a:prstGeom>
+          <a:ln>
+            <a:tailEnd type="triangle"/>
+          </a:ln>
+        </p:spPr>
+        <p:style>
+          <a:lnRef idx="1">
+            <a:schemeClr val="accent1"/>
+          </a:lnRef>
+          <a:fillRef idx="0">
+            <a:schemeClr val="accent1"/>
+          </a:fillRef>
+          <a:effectRef idx="0">
+            <a:schemeClr val="accent1"/>
+          </a:effectRef>
+          <a:fontRef idx="minor">
+            <a:schemeClr val="tx1"/>
+          </a:fontRef>
+        </p:style>
+      </p:cxnSp>
+      <p:sp>
+        <p:nvSpPr>
+          <p:cNvPr id="66" name="Rectangle 65"/>
+          <p:cNvSpPr/>
+          <p:nvPr/>
+        </p:nvSpPr>
+        <p:spPr>
+          <a:xfrm>
+            <a:off x="11150600" y="2943910"/>
+            <a:ext cx="790357" cy="392550"/>
+          </a:xfrm>
+          <a:prstGeom prst="rect">
+            <a:avLst/>
+          </a:prstGeom>
+          <a:solidFill>
+            <a:schemeClr val="accent2">
+              <a:lumMod val="40000"/>
+              <a:lumOff val="60000"/>
+            </a:schemeClr>
+          </a:solidFill>
+          <a:ln>
+            <a:solidFill>
+              <a:schemeClr val="tx1"/>
+            </a:solidFill>
+          </a:ln>
+        </p:spPr>
+        <p:style>
+          <a:lnRef idx="2">
+            <a:schemeClr val="accent1">
+              <a:shade val="50000"/>
+            </a:schemeClr>
+          </a:lnRef>
+          <a:fillRef idx="1">
+            <a:schemeClr val="accent1"/>
+          </a:fillRef>
+          <a:effectRef idx="0">
+            <a:schemeClr val="accent1"/>
+          </a:effectRef>
+          <a:fontRef idx="minor">
+            <a:schemeClr val="lt1"/>
+          </a:fontRef>
+        </p:style>
+        <p:txBody>
+          <a:bodyPr rtlCol="0" anchor="t" anchorCtr="0"/>
+          <a:lstStyle/>
+          <a:p>
+            <a:r>
+              <a:rPr lang="en-US" dirty="0" smtClean="0">
+                <a:solidFill>
+                  <a:schemeClr val="tx1"/>
+                </a:solidFill>
+              </a:rPr>
+              <a:t>color</a:t>
+            </a:r>
+            <a:endParaRPr lang="en-CA" dirty="0">
+              <a:solidFill>
+                <a:schemeClr val="tx1"/>
+              </a:solidFill>
+            </a:endParaRPr>
+          </a:p>
+        </p:txBody>
+      </p:sp>
+      <p:sp>
+        <p:nvSpPr>
+          <p:cNvPr id="67" name="Rectangle 66"/>
+          <p:cNvSpPr/>
+          <p:nvPr/>
+        </p:nvSpPr>
+        <p:spPr>
+          <a:xfrm>
+            <a:off x="11147875" y="3607950"/>
+            <a:ext cx="790357" cy="392550"/>
+          </a:xfrm>
+          <a:prstGeom prst="rect">
+            <a:avLst/>
+          </a:prstGeom>
+          <a:solidFill>
+            <a:schemeClr val="accent2">
+              <a:lumMod val="40000"/>
+              <a:lumOff val="60000"/>
+            </a:schemeClr>
+          </a:solidFill>
+          <a:ln>
+            <a:solidFill>
+              <a:schemeClr val="tx1"/>
+            </a:solidFill>
+          </a:ln>
+        </p:spPr>
+        <p:style>
+          <a:lnRef idx="2">
+            <a:schemeClr val="accent1">
+              <a:shade val="50000"/>
+            </a:schemeClr>
+          </a:lnRef>
+          <a:fillRef idx="1">
+            <a:schemeClr val="accent1"/>
+          </a:fillRef>
+          <a:effectRef idx="0">
+            <a:schemeClr val="accent1"/>
+          </a:effectRef>
+          <a:fontRef idx="minor">
+            <a:schemeClr val="lt1"/>
+          </a:fontRef>
+        </p:style>
+        <p:txBody>
+          <a:bodyPr rtlCol="0" anchor="t" anchorCtr="0"/>
+          <a:lstStyle/>
+          <a:p>
+            <a:r>
+              <a:rPr lang="en-US" dirty="0" smtClean="0">
+                <a:solidFill>
+                  <a:schemeClr val="tx1"/>
+                </a:solidFill>
+              </a:rPr>
+              <a:t>font</a:t>
+            </a:r>
+            <a:endParaRPr lang="en-CA" dirty="0">
+              <a:solidFill>
+                <a:schemeClr val="tx1"/>
+              </a:solidFill>
+            </a:endParaRPr>
+          </a:p>
+        </p:txBody>
+      </p:sp>
+      <p:sp>
+        <p:nvSpPr>
+          <p:cNvPr id="68" name="Rectangular Callout 67"/>
+          <p:cNvSpPr/>
+          <p:nvPr/>
+        </p:nvSpPr>
+        <p:spPr>
+          <a:xfrm>
+            <a:off x="498308" y="3336460"/>
+            <a:ext cx="1354258" cy="751126"/>
+          </a:xfrm>
+          <a:prstGeom prst="wedgeRectCallout">
+            <a:avLst>
+              <a:gd name="adj1" fmla="val 58337"/>
+              <a:gd name="adj2" fmla="val 82742"/>
+            </a:avLst>
+          </a:prstGeom>
+          <a:solidFill>
+            <a:schemeClr val="accent6">
+              <a:lumMod val="20000"/>
+              <a:lumOff val="80000"/>
+            </a:schemeClr>
+          </a:solidFill>
+          <a:ln>
+            <a:solidFill>
+              <a:schemeClr val="tx1"/>
+            </a:solidFill>
+          </a:ln>
+        </p:spPr>
+        <p:style>
+          <a:lnRef idx="2">
+            <a:schemeClr val="accent1">
+              <a:shade val="50000"/>
+            </a:schemeClr>
+          </a:lnRef>
+          <a:fillRef idx="1">
+            <a:schemeClr val="accent1"/>
+          </a:fillRef>
+          <a:effectRef idx="0">
+            <a:schemeClr val="accent1"/>
+          </a:effectRef>
+          <a:fontRef idx="minor">
+            <a:schemeClr val="lt1"/>
+          </a:fontRef>
+        </p:style>
+        <p:txBody>
+          <a:bodyPr rtlCol="0" anchor="t" anchorCtr="0"/>
+          <a:lstStyle/>
+          <a:p>
+            <a:r>
+              <a:rPr lang="en-US" sz="1400" dirty="0" err="1" smtClean="0">
+                <a:solidFill>
+                  <a:schemeClr val="tx1"/>
+                </a:solidFill>
+              </a:rPr>
+              <a:t>myRetarget.h</a:t>
+            </a:r>
+            <a:endParaRPr lang="en-US" sz="1400" dirty="0" smtClean="0">
+              <a:solidFill>
+                <a:schemeClr val="tx1"/>
+              </a:solidFill>
+            </a:endParaRPr>
+          </a:p>
+          <a:p>
+            <a:r>
+              <a:rPr lang="en-US" sz="1400" dirty="0" smtClean="0">
+                <a:solidFill>
+                  <a:schemeClr val="tx1"/>
+                </a:solidFill>
+              </a:rPr>
+              <a:t>switches which resource to use</a:t>
+            </a:r>
+            <a:endParaRPr lang="en-CA" sz="1400" dirty="0">
+              <a:solidFill>
+                <a:schemeClr val="tx1"/>
+              </a:solidFill>
+            </a:endParaRPr>
+          </a:p>
+        </p:txBody>
+      </p:sp>
+      <p:sp>
+        <p:nvSpPr>
+          <p:cNvPr id="69" name="Rectangle 68"/>
+          <p:cNvSpPr/>
+          <p:nvPr/>
+        </p:nvSpPr>
+        <p:spPr>
+          <a:xfrm>
+            <a:off x="9161244" y="2142145"/>
+            <a:ext cx="1006429" cy="461665"/>
+          </a:xfrm>
+          <a:prstGeom prst="rect">
+            <a:avLst/>
+          </a:prstGeom>
+        </p:spPr>
+        <p:txBody>
+          <a:bodyPr wrap="none">
+            <a:spAutoFit/>
+          </a:bodyPr>
+          <a:lstStyle/>
+          <a:p>
+            <a:r>
+              <a:rPr lang="en-US" sz="2400" b="1" dirty="0" smtClean="0">
+                <a:solidFill>
+                  <a:schemeClr val="accent1">
+                    <a:lumMod val="50000"/>
+                  </a:schemeClr>
+                </a:solidFill>
+              </a:rPr>
+              <a:t>others</a:t>
+            </a:r>
+            <a:endParaRPr lang="en-CA" sz="2400" b="1" dirty="0">
+              <a:solidFill>
+                <a:schemeClr val="accent1">
+                  <a:lumMod val="50000"/>
+                </a:schemeClr>
+              </a:solidFill>
+            </a:endParaRPr>
+          </a:p>
+        </p:txBody>
+      </p:sp>
+      <p:sp>
+        <p:nvSpPr>
+          <p:cNvPr id="70" name="Up-Down Arrow 69"/>
+          <p:cNvSpPr/>
+          <p:nvPr/>
+        </p:nvSpPr>
+        <p:spPr>
+          <a:xfrm>
+            <a:off x="81643" y="4991169"/>
+            <a:ext cx="213401" cy="1866831"/>
+          </a:xfrm>
+          <a:prstGeom prst="upDownArrow">
+            <a:avLst/>
+          </a:prstGeom>
+          <a:solidFill>
+            <a:schemeClr val="accent4">
+              <a:lumMod val="40000"/>
+              <a:lumOff val="60000"/>
+            </a:schemeClr>
+          </a:solidFill>
+          <a:ln>
+            <a:solidFill>
+              <a:schemeClr val="tx1"/>
+            </a:solidFill>
+          </a:ln>
+        </p:spPr>
+        <p:style>
+          <a:lnRef idx="2">
+            <a:schemeClr val="accent1">
+              <a:shade val="50000"/>
+            </a:schemeClr>
+          </a:lnRef>
+          <a:fillRef idx="1">
+            <a:schemeClr val="accent1"/>
+          </a:fillRef>
+          <a:effectRef idx="0">
+            <a:schemeClr val="accent1"/>
+          </a:effectRef>
+          <a:fontRef idx="minor">
+            <a:schemeClr val="lt1"/>
+          </a:fontRef>
+        </p:style>
+        <p:txBody>
+          <a:bodyPr rtlCol="0" anchor="ctr"/>
+          <a:lstStyle/>
+          <a:p>
+            <a:pPr algn="ctr"/>
+            <a:endParaRPr lang="en-CA"/>
+          </a:p>
+        </p:txBody>
+      </p:sp>
+      <p:sp>
+        <p:nvSpPr>
+          <p:cNvPr id="71" name="Up-Down Arrow 70"/>
+          <p:cNvSpPr/>
+          <p:nvPr/>
+        </p:nvSpPr>
+        <p:spPr>
+          <a:xfrm>
+            <a:off x="81644" y="2438710"/>
+            <a:ext cx="190886" cy="2552460"/>
+          </a:xfrm>
+          <a:prstGeom prst="upDownArrow">
+            <a:avLst/>
+          </a:prstGeom>
+          <a:solidFill>
+            <a:schemeClr val="accent4">
+              <a:lumMod val="40000"/>
+              <a:lumOff val="60000"/>
+            </a:schemeClr>
+          </a:solidFill>
+          <a:ln>
+            <a:solidFill>
+              <a:schemeClr val="tx1"/>
+            </a:solidFill>
+          </a:ln>
+        </p:spPr>
+        <p:style>
+          <a:lnRef idx="2">
+            <a:schemeClr val="accent1">
+              <a:shade val="50000"/>
+            </a:schemeClr>
+          </a:lnRef>
+          <a:fillRef idx="1">
+            <a:schemeClr val="accent1"/>
+          </a:fillRef>
+          <a:effectRef idx="0">
+            <a:schemeClr val="accent1"/>
+          </a:effectRef>
+          <a:fontRef idx="minor">
+            <a:schemeClr val="lt1"/>
+          </a:fontRef>
+        </p:style>
+        <p:txBody>
+          <a:bodyPr rtlCol="0" anchor="ctr"/>
+          <a:lstStyle/>
+          <a:p>
+            <a:pPr algn="ctr"/>
+            <a:endParaRPr lang="en-CA"/>
+          </a:p>
+        </p:txBody>
+      </p:sp>
+      <p:sp>
+        <p:nvSpPr>
+          <p:cNvPr id="72" name="Up-Down Arrow 71"/>
+          <p:cNvSpPr/>
+          <p:nvPr/>
+        </p:nvSpPr>
+        <p:spPr>
+          <a:xfrm>
+            <a:off x="79343" y="1273865"/>
+            <a:ext cx="215701" cy="1164844"/>
+          </a:xfrm>
+          <a:prstGeom prst="upDownArrow">
+            <a:avLst/>
+          </a:prstGeom>
+          <a:solidFill>
+            <a:schemeClr val="accent4">
+              <a:lumMod val="40000"/>
+              <a:lumOff val="60000"/>
+            </a:schemeClr>
+          </a:solidFill>
+          <a:ln>
+            <a:solidFill>
+              <a:schemeClr val="tx1"/>
+            </a:solidFill>
+          </a:ln>
+        </p:spPr>
+        <p:style>
+          <a:lnRef idx="2">
+            <a:schemeClr val="accent1">
+              <a:shade val="50000"/>
+            </a:schemeClr>
+          </a:lnRef>
+          <a:fillRef idx="1">
+            <a:schemeClr val="accent1"/>
+          </a:fillRef>
+          <a:effectRef idx="0">
+            <a:schemeClr val="accent1"/>
+          </a:effectRef>
+          <a:fontRef idx="minor">
+            <a:schemeClr val="lt1"/>
+          </a:fontRef>
+        </p:style>
+        <p:txBody>
+          <a:bodyPr rtlCol="0" anchor="ctr"/>
+          <a:lstStyle/>
+          <a:p>
+            <a:pPr algn="ctr"/>
+            <a:endParaRPr lang="en-CA"/>
+          </a:p>
+        </p:txBody>
+      </p:sp>
+      <p:sp>
+        <p:nvSpPr>
+          <p:cNvPr id="73" name="Rectangle 72"/>
+          <p:cNvSpPr/>
+          <p:nvPr/>
+        </p:nvSpPr>
+        <p:spPr>
+          <a:xfrm>
+            <a:off x="220087" y="1673496"/>
+            <a:ext cx="996170" cy="338554"/>
+          </a:xfrm>
+          <a:prstGeom prst="rect">
+            <a:avLst/>
+          </a:prstGeom>
+        </p:spPr>
+        <p:txBody>
+          <a:bodyPr wrap="none">
+            <a:spAutoFit/>
+          </a:bodyPr>
+          <a:lstStyle/>
+          <a:p>
+            <a:r>
+              <a:rPr lang="en-US" sz="1600" b="1" dirty="0" smtClean="0">
+                <a:solidFill>
+                  <a:srgbClr val="FF0000"/>
+                </a:solidFill>
+              </a:rPr>
+              <a:t>App layer</a:t>
+            </a:r>
+            <a:endParaRPr lang="en-CA" sz="1600" b="1" dirty="0">
+              <a:solidFill>
+                <a:srgbClr val="FF0000"/>
+              </a:solidFill>
+            </a:endParaRPr>
+          </a:p>
+        </p:txBody>
+      </p:sp>
+      <p:sp>
+        <p:nvSpPr>
+          <p:cNvPr id="74" name="Rectangle 73"/>
+          <p:cNvSpPr/>
+          <p:nvPr/>
+        </p:nvSpPr>
+        <p:spPr>
+          <a:xfrm>
+            <a:off x="200659" y="2704603"/>
+            <a:ext cx="1049903" cy="338554"/>
+          </a:xfrm>
+          <a:prstGeom prst="rect">
+            <a:avLst/>
+          </a:prstGeom>
+        </p:spPr>
+        <p:txBody>
+          <a:bodyPr wrap="none">
+            <a:spAutoFit/>
+          </a:bodyPr>
+          <a:lstStyle/>
+          <a:p>
+            <a:r>
+              <a:rPr lang="en-US" sz="1600" b="1" dirty="0" smtClean="0">
+                <a:solidFill>
+                  <a:srgbClr val="FF0000"/>
+                </a:solidFill>
+              </a:rPr>
+              <a:t>Infra layer</a:t>
+            </a:r>
+            <a:endParaRPr lang="en-CA" sz="1600" b="1" dirty="0">
+              <a:solidFill>
+                <a:srgbClr val="FF0000"/>
+              </a:solidFill>
+            </a:endParaRPr>
+          </a:p>
+        </p:txBody>
+      </p:sp>
+      <p:sp>
+        <p:nvSpPr>
+          <p:cNvPr id="76" name="Rectangle 75"/>
+          <p:cNvSpPr/>
+          <p:nvPr/>
+        </p:nvSpPr>
+        <p:spPr>
+          <a:xfrm>
+            <a:off x="249415" y="5074758"/>
+            <a:ext cx="1427891" cy="338554"/>
+          </a:xfrm>
+          <a:prstGeom prst="rect">
+            <a:avLst/>
+          </a:prstGeom>
+        </p:spPr>
+        <p:txBody>
+          <a:bodyPr wrap="none">
+            <a:spAutoFit/>
+          </a:bodyPr>
+          <a:lstStyle/>
+          <a:p>
+            <a:r>
+              <a:rPr lang="en-US" sz="1600" b="1" dirty="0" smtClean="0">
+                <a:solidFill>
+                  <a:srgbClr val="FF0000"/>
+                </a:solidFill>
+              </a:rPr>
+              <a:t>Resource layer</a:t>
+            </a:r>
+            <a:endParaRPr lang="en-CA" sz="1600" b="1" dirty="0">
+              <a:solidFill>
+                <a:srgbClr val="FF0000"/>
+              </a:solidFill>
+            </a:endParaRPr>
+          </a:p>
+        </p:txBody>
+      </p:sp>
+      <p:sp>
+        <p:nvSpPr>
+          <p:cNvPr id="78" name="Title 1"/>
+          <p:cNvSpPr txBox="1">
+            <a:spLocks/>
+          </p:cNvSpPr>
+          <p:nvPr/>
+        </p:nvSpPr>
+        <p:spPr>
+          <a:xfrm>
+            <a:off x="416138" y="239195"/>
+            <a:ext cx="10515600" cy="839440"/>
+          </a:xfrm>
+          <a:prstGeom prst="rect">
+            <a:avLst/>
+          </a:prstGeom>
+        </p:spPr>
+        <p:txBody>
+          <a:bodyPr vert="horz" lIns="91440" tIns="45720" rIns="91440" bIns="45720" rtlCol="0" anchor="b">
+            <a:normAutofit fontScale="92500" lnSpcReduction="10000"/>
+          </a:bodyPr>
+          <a:lstStyle>
+            <a:lvl1pPr algn="ctr" defTabSz="914400" rtl="0" eaLnBrk="1" latinLnBrk="0" hangingPunct="1">
+              <a:lnSpc>
+                <a:spcPct val="90000"/>
+              </a:lnSpc>
+              <a:spcBef>
+                <a:spcPct val="0"/>
+              </a:spcBef>
+              <a:buNone/>
+              <a:defRPr sz="6000" kern="1200">
+                <a:solidFill>
+                  <a:schemeClr val="tx1"/>
+                </a:solidFill>
+                <a:latin typeface="+mj-lt"/>
+                <a:ea typeface="+mj-ea"/>
+                <a:cs typeface="+mj-cs"/>
+              </a:defRPr>
+            </a:lvl1pPr>
+          </a:lstStyle>
+          <a:p>
+            <a:pPr algn="l"/>
+            <a:r>
+              <a:rPr lang="en-US" dirty="0" smtClean="0"/>
+              <a:t>Software Structure</a:t>
+            </a:r>
+            <a:endParaRPr lang="en-CA" dirty="0"/>
+          </a:p>
+        </p:txBody>
+      </p:sp>
+      <p:sp>
+        <p:nvSpPr>
+          <p:cNvPr id="80" name="Rectangular Callout 79"/>
+          <p:cNvSpPr/>
+          <p:nvPr/>
+        </p:nvSpPr>
+        <p:spPr>
+          <a:xfrm>
+            <a:off x="7708708" y="1548850"/>
+            <a:ext cx="1817411" cy="668141"/>
+          </a:xfrm>
+          <a:prstGeom prst="wedgeRectCallout">
+            <a:avLst>
+              <a:gd name="adj1" fmla="val -73152"/>
+              <a:gd name="adj2" fmla="val 20368"/>
+            </a:avLst>
+          </a:prstGeom>
+          <a:solidFill>
+            <a:schemeClr val="accent6">
+              <a:lumMod val="20000"/>
+              <a:lumOff val="80000"/>
+            </a:schemeClr>
+          </a:solidFill>
+          <a:ln>
+            <a:solidFill>
+              <a:schemeClr val="tx1"/>
+            </a:solidFill>
+          </a:ln>
+        </p:spPr>
+        <p:style>
+          <a:lnRef idx="2">
+            <a:schemeClr val="accent1">
+              <a:shade val="50000"/>
+            </a:schemeClr>
+          </a:lnRef>
+          <a:fillRef idx="1">
+            <a:schemeClr val="accent1"/>
+          </a:fillRef>
+          <a:effectRef idx="0">
+            <a:schemeClr val="accent1"/>
+          </a:effectRef>
+          <a:fontRef idx="minor">
+            <a:schemeClr val="lt1"/>
+          </a:fontRef>
+        </p:style>
+        <p:txBody>
+          <a:bodyPr rtlCol="0" anchor="t" anchorCtr="0"/>
+          <a:lstStyle/>
+          <a:p>
+            <a:r>
+              <a:rPr lang="en-US" sz="1600" dirty="0" smtClean="0">
+                <a:solidFill>
+                  <a:schemeClr val="tx1"/>
+                </a:solidFill>
+              </a:rPr>
+              <a:t>User level software goes here</a:t>
+            </a:r>
+            <a:endParaRPr lang="en-CA" sz="1600" dirty="0">
+              <a:solidFill>
+                <a:schemeClr val="tx1"/>
+              </a:solidFill>
+            </a:endParaRPr>
+          </a:p>
+        </p:txBody>
+      </p:sp>
+    </p:spTree>
+    <p:extLst>
+      <p:ext uri="{BB962C8B-B14F-4D97-AF65-F5344CB8AC3E}">
+        <p14:creationId xmlns:p14="http://schemas.microsoft.com/office/powerpoint/2010/main" val="3871403284"/>
+      </p:ext>
+    </p:extLst>
+  </p:cSld>
+  <p:clrMapOvr>
+    <a:masterClrMapping/>
+  </p:clrMapOvr>
+</p:sld>
+</file>
+
 <file path=ppt/theme/theme1.xml><?xml version="1.0" encoding="utf-8"?>
 <a:theme xmlns:a="http://schemas.openxmlformats.org/drawingml/2006/main" name="Office Theme">
   <a:themeElements>

</xml_diff>